<commit_message>
Updated Isambard results for HostDevTransfer
Faster than before, but now no zero copy.
</commit_message>
<xml_diff>
--- a/advanced_part1.pptx
+++ b/advanced_part1.pptx
@@ -9573,9 +9573,14 @@
             </a:r>
           </a:p>
           <a:p>
-            <a:r>
-              <a:rPr lang="en-US" dirty="0"/>
-              <a:t>The operating system</a:t>
+            <a:pPr lvl="1"/>
+            <a:r>
+              <a:rPr lang="en-US" b="1" u="sng" dirty="0">
+                <a:solidFill>
+                  <a:srgbClr val="C00000"/>
+                </a:solidFill>
+              </a:rPr>
+              <a:t>Extra data copies by the operating system</a:t>
             </a:r>
           </a:p>
           <a:p>
@@ -12584,7 +12589,7 @@
             </a:r>
             <a:r>
               <a:rPr lang="en-US" dirty="0"/>
-              <a:t>side-steps this issue by giving the host process </a:t>
+              <a:t>avoids these inefficiencies by giving the host process </a:t>
             </a:r>
             <a:r>
               <a:rPr lang="en-US" b="1" i="1" dirty="0">
@@ -12611,7 +12616,19 @@
           <a:p>
             <a:r>
               <a:rPr lang="en-US" dirty="0"/>
-              <a:t>Disclaimer: Not all drivers support it, and it makes allocations much more expensive (so it would be slow to continually allocate and free pinned memory)</a:t>
+              <a:t>Disclaimer: Not all drivers support it, and it makes memory allocations </a:t>
+            </a:r>
+            <a:r>
+              <a:rPr lang="en-US" b="1" i="1" dirty="0">
+                <a:solidFill>
+                  <a:srgbClr val="C00000"/>
+                </a:solidFill>
+              </a:rPr>
+              <a:t>much</a:t>
+            </a:r>
+            <a:r>
+              <a:rPr lang="en-US" dirty="0"/>
+              <a:t> more expensive (so it would be slow to continually allocate and free pinned memory)</a:t>
             </a:r>
           </a:p>
         </p:txBody>
@@ -20843,7 +20860,48 @@
               </a:rPr>
               <a:t>Using OpenCL device: Tesla P100-PCIE-16GB</a:t>
             </a:r>
-            <a:endParaRPr lang="de-DE" sz="2000" dirty="0">
+          </a:p>
+          <a:p>
+            <a:pPr marL="0" indent="0">
+              <a:buNone/>
+            </a:pPr>
+            <a:r>
+              <a:rPr lang="en-GB" sz="2000" dirty="0">
+                <a:latin typeface="Courier New"/>
+                <a:cs typeface="Courier New"/>
+              </a:rPr>
+              <a:t>Buffer size = 2 MB</a:t>
+            </a:r>
+          </a:p>
+          <a:p>
+            <a:pPr marL="0" indent="0">
+              <a:buNone/>
+            </a:pPr>
+            <a:r>
+              <a:rPr lang="en-GB" sz="2000" dirty="0">
+                <a:latin typeface="Courier New"/>
+                <a:cs typeface="Courier New"/>
+              </a:rPr>
+              <a:t>Iterations = 32</a:t>
+            </a:r>
+          </a:p>
+          <a:p>
+            <a:pPr marL="0" indent="0">
+              <a:buNone/>
+            </a:pPr>
+            <a:r>
+              <a:rPr lang="en-GB" sz="2000" dirty="0">
+                <a:latin typeface="Courier New"/>
+                <a:cs typeface="Courier New"/>
+              </a:rPr>
+              <a:t>Device does not have host-unified memory</a:t>
+            </a:r>
+          </a:p>
+          <a:p>
+            <a:pPr marL="0" indent="0">
+              <a:buNone/>
+            </a:pPr>
+            <a:endParaRPr lang="en-GB" sz="2000" dirty="0">
               <a:latin typeface="Courier New"/>
               <a:cs typeface="Courier New"/>
             </a:endParaRPr>
@@ -20852,21 +20910,12 @@
             <a:pPr marL="0" indent="0">
               <a:buNone/>
             </a:pPr>
-            <a:endParaRPr lang="de-DE" sz="2000" dirty="0">
-              <a:latin typeface="Courier New"/>
-              <a:cs typeface="Courier New"/>
-            </a:endParaRPr>
-          </a:p>
-          <a:p>
-            <a:pPr marL="0" indent="0">
-              <a:buNone/>
-            </a:pPr>
             <a:r>
               <a:rPr lang="en-GB" sz="2000" dirty="0">
                 <a:latin typeface="Courier New"/>
                 <a:cs typeface="Courier New"/>
               </a:rPr>
-              <a:t>Type          Total   Transfer       Bandwidth</a:t>
+              <a:t>Type          Total   Transfer       Bandwidth</a:t>
             </a:r>
           </a:p>
           <a:p>
@@ -20890,7 +20939,7 @@
                 <a:latin typeface="Courier New"/>
                 <a:cs typeface="Courier New"/>
               </a:rPr>
-              <a:t>Baseline      0.03s      0.02s       3.32 GB/s</a:t>
+              <a:t>Baseline      0.02s      0.01s       6.17 GB/s</a:t>
             </a:r>
           </a:p>
           <a:p>
@@ -20902,19 +20951,7 @@
                 <a:latin typeface="Courier New"/>
                 <a:cs typeface="Courier New"/>
               </a:rPr>
-              <a:t>Pinned        0.01s      0.01s      11.99 GB/s</a:t>
-            </a:r>
-          </a:p>
-          <a:p>
-            <a:pPr marL="0" indent="0">
-              <a:buNone/>
-            </a:pPr>
-            <a:r>
-              <a:rPr lang="en-GB" sz="2000" dirty="0">
-                <a:latin typeface="Courier New"/>
-                <a:cs typeface="Courier New"/>
-              </a:rPr>
-              <a:t>Zero-Copy     0.02s      0.01s      10.18 GB/s</a:t>
+              <a:t>Pinned        0.01s      0.01s      12.42 GB/s</a:t>
             </a:r>
           </a:p>
           <a:p>

</xml_diff>

<commit_message>
Improvements for IWOCL 2019
Expanded hwloc explanation and example output.

Also added animations to help explain zreo copy and pinned memory examples.
</commit_message>
<xml_diff>
--- a/advanced_part1.pptx
+++ b/advanced_part1.pptx
@@ -250,7 +250,7 @@
           <a:p>
             <a:fld id="{C020D4C0-2770-3946-ABDD-0C7492C2C34D}" type="datetimeFigureOut">
               <a:rPr lang="en-US" smtClean="0"/>
-              <a:t>5/9/19</a:t>
+              <a:t>5/12/19</a:t>
             </a:fld>
             <a:endParaRPr lang="en-GB"/>
           </a:p>
@@ -601,6 +601,90 @@
 </p:notes>
 </file>
 
+<file path=ppt/notesSlides/notesSlide10.xml><?xml version="1.0" encoding="utf-8"?>
+<p:notes xmlns:a="http://schemas.openxmlformats.org/drawingml/2006/main" xmlns:r="http://schemas.openxmlformats.org/officeDocument/2006/relationships" xmlns:p="http://schemas.openxmlformats.org/presentationml/2006/main">
+  <p:cSld>
+    <p:spTree>
+      <p:nvGrpSpPr>
+        <p:cNvPr id="1" name=""/>
+        <p:cNvGrpSpPr/>
+        <p:nvPr/>
+      </p:nvGrpSpPr>
+      <p:grpSpPr>
+        <a:xfrm>
+          <a:off x="0" y="0"/>
+          <a:ext cx="0" cy="0"/>
+          <a:chOff x="0" y="0"/>
+          <a:chExt cx="0" cy="0"/>
+        </a:xfrm>
+      </p:grpSpPr>
+      <p:sp>
+        <p:nvSpPr>
+          <p:cNvPr id="2" name="Slide Image Placeholder 1"/>
+          <p:cNvSpPr>
+            <a:spLocks noGrp="1" noRot="1" noChangeAspect="1"/>
+          </p:cNvSpPr>
+          <p:nvPr>
+            <p:ph type="sldImg"/>
+          </p:nvPr>
+        </p:nvSpPr>
+        <p:spPr/>
+      </p:sp>
+      <p:sp>
+        <p:nvSpPr>
+          <p:cNvPr id="3" name="Notes Placeholder 2"/>
+          <p:cNvSpPr>
+            <a:spLocks noGrp="1"/>
+          </p:cNvSpPr>
+          <p:nvPr>
+            <p:ph type="body" idx="1"/>
+          </p:nvPr>
+        </p:nvSpPr>
+        <p:spPr/>
+        <p:txBody>
+          <a:bodyPr/>
+          <a:lstStyle/>
+          <a:p>
+            <a:endParaRPr lang="en-GB" dirty="0"/>
+          </a:p>
+        </p:txBody>
+      </p:sp>
+      <p:sp>
+        <p:nvSpPr>
+          <p:cNvPr id="4" name="Slide Number Placeholder 3"/>
+          <p:cNvSpPr>
+            <a:spLocks noGrp="1"/>
+          </p:cNvSpPr>
+          <p:nvPr>
+            <p:ph type="sldNum" sz="quarter" idx="10"/>
+          </p:nvPr>
+        </p:nvSpPr>
+        <p:spPr/>
+        <p:txBody>
+          <a:bodyPr/>
+          <a:lstStyle/>
+          <a:p>
+            <a:fld id="{18B7B4CC-BAF8-A446-A722-9B4FBD8C20C1}" type="slidenum">
+              <a:rPr lang="en-GB" smtClean="0"/>
+              <a:t>34</a:t>
+            </a:fld>
+            <a:endParaRPr lang="en-GB"/>
+          </a:p>
+        </p:txBody>
+      </p:sp>
+    </p:spTree>
+    <p:extLst>
+      <p:ext uri="{BB962C8B-B14F-4D97-AF65-F5344CB8AC3E}">
+        <p14:creationId xmlns:p14="http://schemas.microsoft.com/office/powerpoint/2010/main" val="1721967820"/>
+      </p:ext>
+    </p:extLst>
+  </p:cSld>
+  <p:clrMapOvr>
+    <a:masterClrMapping/>
+  </p:clrMapOvr>
+</p:notes>
+</file>
+
 <file path=ppt/notesSlides/notesSlide2.xml><?xml version="1.0" encoding="utf-8"?>
 <p:notes xmlns:a="http://schemas.openxmlformats.org/drawingml/2006/main" xmlns:r="http://schemas.openxmlformats.org/officeDocument/2006/relationships" xmlns:p="http://schemas.openxmlformats.org/presentationml/2006/main">
   <p:cSld>
@@ -730,15 +814,1315 @@
           <a:lstStyle/>
           <a:p>
             <a:r>
-              <a:rPr lang="en-GB" dirty="0"/>
-              <a:t>CL_DEVICE_PARTITION_BY_AFFINITY_DOMAIN would be ideal for this, but Intel doesn’t support it!</a:t>
-            </a:r>
-          </a:p>
-          <a:p>
-            <a:r>
-              <a:rPr lang="en-GB" dirty="0"/>
-              <a:t>For MPI-enabled codes, running an MPI rank per socket would potentially be a much cleaner solution.</a:t>
-            </a:r>
+              <a:rPr lang="en-US" dirty="0"/>
+              <a:t>If you want to try </a:t>
+            </a:r>
+            <a:r>
+              <a:rPr lang="en-US" dirty="0" err="1"/>
+              <a:t>hwloc</a:t>
+            </a:r>
+            <a:r>
+              <a:rPr lang="en-US" dirty="0"/>
+              <a:t> on Isambard, you need to do the following:</a:t>
+            </a:r>
+          </a:p>
+          <a:p>
+            <a:endParaRPr lang="en-US" dirty="0"/>
+          </a:p>
+          <a:p>
+            <a:pPr marL="228600" indent="-228600">
+              <a:buAutoNum type="arabicParenR"/>
+            </a:pPr>
+            <a:r>
+              <a:rPr lang="en-US" dirty="0"/>
+              <a:t>module load </a:t>
+            </a:r>
+            <a:r>
+              <a:rPr lang="en-US" dirty="0" err="1"/>
+              <a:t>hwloc</a:t>
+            </a:r>
+            <a:r>
+              <a:rPr lang="en-US" dirty="0"/>
+              <a:t>/1.11.3</a:t>
+            </a:r>
+          </a:p>
+          <a:p>
+            <a:pPr marL="228600" indent="-228600">
+              <a:buAutoNum type="arabicParenR"/>
+            </a:pPr>
+            <a:r>
+              <a:rPr lang="en-US" dirty="0" err="1"/>
+              <a:t>Hwloc</a:t>
+            </a:r>
+            <a:r>
+              <a:rPr lang="en-US" dirty="0"/>
+              <a:t>-ls</a:t>
+            </a:r>
+          </a:p>
+          <a:p>
+            <a:pPr marL="228600" indent="-228600">
+              <a:buAutoNum type="arabicParenR"/>
+            </a:pPr>
+            <a:endParaRPr lang="en-US" dirty="0"/>
+          </a:p>
+          <a:p>
+            <a:pPr marL="0" indent="0">
+              <a:buFontTx/>
+              <a:buNone/>
+            </a:pPr>
+            <a:r>
+              <a:rPr lang="en-US" dirty="0"/>
+              <a:t>Example output on Isambard:</a:t>
+            </a:r>
+          </a:p>
+          <a:p>
+            <a:pPr marL="0" indent="0">
+              <a:buFontTx/>
+              <a:buNone/>
+            </a:pPr>
+            <a:endParaRPr lang="en-US" dirty="0"/>
+          </a:p>
+          <a:p>
+            <a:r>
+              <a:rPr lang="en-GB" sz="1200" kern="1200" dirty="0">
+                <a:solidFill>
+                  <a:schemeClr val="tx1"/>
+                </a:solidFill>
+                <a:effectLst/>
+                <a:latin typeface="+mn-lt"/>
+                <a:ea typeface="+mn-ea"/>
+                <a:cs typeface="+mn-cs"/>
+              </a:rPr>
+              <a:t>[br-train22@login-01 ~]$ </a:t>
+            </a:r>
+            <a:r>
+              <a:rPr lang="en-GB" sz="1200" kern="1200" dirty="0" err="1">
+                <a:solidFill>
+                  <a:schemeClr val="tx1"/>
+                </a:solidFill>
+                <a:effectLst/>
+                <a:latin typeface="+mn-lt"/>
+                <a:ea typeface="+mn-ea"/>
+                <a:cs typeface="+mn-cs"/>
+              </a:rPr>
+              <a:t>hwloc</a:t>
+            </a:r>
+            <a:r>
+              <a:rPr lang="en-GB" sz="1200" kern="1200" dirty="0">
+                <a:solidFill>
+                  <a:schemeClr val="tx1"/>
+                </a:solidFill>
+                <a:effectLst/>
+                <a:latin typeface="+mn-lt"/>
+                <a:ea typeface="+mn-ea"/>
+                <a:cs typeface="+mn-cs"/>
+              </a:rPr>
+              <a:t>-ls</a:t>
+            </a:r>
+          </a:p>
+          <a:p>
+            <a:r>
+              <a:rPr lang="en-GB" sz="1200" kern="1200" dirty="0">
+                <a:solidFill>
+                  <a:schemeClr val="tx1"/>
+                </a:solidFill>
+                <a:effectLst/>
+                <a:latin typeface="+mn-lt"/>
+                <a:ea typeface="+mn-ea"/>
+                <a:cs typeface="+mn-cs"/>
+              </a:rPr>
+              <a:t>Machine (128GB total)</a:t>
+            </a:r>
+          </a:p>
+          <a:p>
+            <a:r>
+              <a:rPr lang="en-GB" sz="1200" kern="1200" dirty="0">
+                <a:solidFill>
+                  <a:schemeClr val="tx1"/>
+                </a:solidFill>
+                <a:effectLst/>
+                <a:latin typeface="+mn-lt"/>
+                <a:ea typeface="+mn-ea"/>
+                <a:cs typeface="+mn-cs"/>
+              </a:rPr>
+              <a:t>  </a:t>
+            </a:r>
+            <a:r>
+              <a:rPr lang="en-GB" sz="1200" kern="1200" dirty="0" err="1">
+                <a:solidFill>
+                  <a:schemeClr val="tx1"/>
+                </a:solidFill>
+                <a:effectLst/>
+                <a:latin typeface="+mn-lt"/>
+                <a:ea typeface="+mn-ea"/>
+                <a:cs typeface="+mn-cs"/>
+              </a:rPr>
+              <a:t>NUMANode</a:t>
+            </a:r>
+            <a:r>
+              <a:rPr lang="en-GB" sz="1200" kern="1200" dirty="0">
+                <a:solidFill>
+                  <a:schemeClr val="tx1"/>
+                </a:solidFill>
+                <a:effectLst/>
+                <a:latin typeface="+mn-lt"/>
+                <a:ea typeface="+mn-ea"/>
+                <a:cs typeface="+mn-cs"/>
+              </a:rPr>
+              <a:t> L#0 (P#0 64GB)</a:t>
+            </a:r>
+          </a:p>
+          <a:p>
+            <a:r>
+              <a:rPr lang="en-GB" sz="1200" kern="1200" dirty="0">
+                <a:solidFill>
+                  <a:schemeClr val="tx1"/>
+                </a:solidFill>
+                <a:effectLst/>
+                <a:latin typeface="+mn-lt"/>
+                <a:ea typeface="+mn-ea"/>
+                <a:cs typeface="+mn-cs"/>
+              </a:rPr>
+              <a:t>    Package L#0 + L3 L#0 (45MB)</a:t>
+            </a:r>
+          </a:p>
+          <a:p>
+            <a:r>
+              <a:rPr lang="en-GB" sz="1200" kern="1200" dirty="0">
+                <a:solidFill>
+                  <a:schemeClr val="tx1"/>
+                </a:solidFill>
+                <a:effectLst/>
+                <a:latin typeface="+mn-lt"/>
+                <a:ea typeface="+mn-ea"/>
+                <a:cs typeface="+mn-cs"/>
+              </a:rPr>
+              <a:t>      L2 L#0 (256KB) + L1d L#0 (32KB) + L1i L#0 (32KB) + Core L#0 + PU L#0 (P#0)</a:t>
+            </a:r>
+          </a:p>
+          <a:p>
+            <a:r>
+              <a:rPr lang="en-GB" sz="1200" kern="1200" dirty="0">
+                <a:solidFill>
+                  <a:schemeClr val="tx1"/>
+                </a:solidFill>
+                <a:effectLst/>
+                <a:latin typeface="+mn-lt"/>
+                <a:ea typeface="+mn-ea"/>
+                <a:cs typeface="+mn-cs"/>
+              </a:rPr>
+              <a:t>      L2 L#1 (256KB) + L1d L#1 (32KB) + L1i L#1 (32KB) + Core L#1 + PU L#1 (P#1)</a:t>
+            </a:r>
+          </a:p>
+          <a:p>
+            <a:r>
+              <a:rPr lang="en-GB" sz="1200" kern="1200" dirty="0">
+                <a:solidFill>
+                  <a:schemeClr val="tx1"/>
+                </a:solidFill>
+                <a:effectLst/>
+                <a:latin typeface="+mn-lt"/>
+                <a:ea typeface="+mn-ea"/>
+                <a:cs typeface="+mn-cs"/>
+              </a:rPr>
+              <a:t>      L2 L#2 (256KB) + L1d L#2 (32KB) + L1i L#2 (32KB) + Core L#2 + PU L#2 (P#2)</a:t>
+            </a:r>
+          </a:p>
+          <a:p>
+            <a:r>
+              <a:rPr lang="en-GB" sz="1200" kern="1200" dirty="0">
+                <a:solidFill>
+                  <a:schemeClr val="tx1"/>
+                </a:solidFill>
+                <a:effectLst/>
+                <a:latin typeface="+mn-lt"/>
+                <a:ea typeface="+mn-ea"/>
+                <a:cs typeface="+mn-cs"/>
+              </a:rPr>
+              <a:t>      L2 L#3 (256KB) + L1d L#3 (32KB) + L1i L#3 (32KB) + Core L#3 + PU L#3 (P#3)</a:t>
+            </a:r>
+          </a:p>
+          <a:p>
+            <a:r>
+              <a:rPr lang="en-GB" sz="1200" kern="1200" dirty="0">
+                <a:solidFill>
+                  <a:schemeClr val="tx1"/>
+                </a:solidFill>
+                <a:effectLst/>
+                <a:latin typeface="+mn-lt"/>
+                <a:ea typeface="+mn-ea"/>
+                <a:cs typeface="+mn-cs"/>
+              </a:rPr>
+              <a:t>      L2 L#4 (256KB) + L1d L#4 (32KB) + L1i L#4 (32KB) + Core L#4 + PU L#4 (P#4)</a:t>
+            </a:r>
+          </a:p>
+          <a:p>
+            <a:r>
+              <a:rPr lang="en-GB" sz="1200" kern="1200" dirty="0">
+                <a:solidFill>
+                  <a:schemeClr val="tx1"/>
+                </a:solidFill>
+                <a:effectLst/>
+                <a:latin typeface="+mn-lt"/>
+                <a:ea typeface="+mn-ea"/>
+                <a:cs typeface="+mn-cs"/>
+              </a:rPr>
+              <a:t>      L2 L#5 (256KB) + L1d L#5 (32KB) + L1i L#5 (32KB) + Core L#5 + PU L#5 (P#5)</a:t>
+            </a:r>
+          </a:p>
+          <a:p>
+            <a:r>
+              <a:rPr lang="en-GB" sz="1200" kern="1200" dirty="0">
+                <a:solidFill>
+                  <a:schemeClr val="tx1"/>
+                </a:solidFill>
+                <a:effectLst/>
+                <a:latin typeface="+mn-lt"/>
+                <a:ea typeface="+mn-ea"/>
+                <a:cs typeface="+mn-cs"/>
+              </a:rPr>
+              <a:t>      L2 L#6 (256KB) + L1d L#6 (32KB) + L1i L#6 (32KB) + Core L#6 + PU L#6 (P#6)</a:t>
+            </a:r>
+          </a:p>
+          <a:p>
+            <a:r>
+              <a:rPr lang="en-GB" sz="1200" kern="1200" dirty="0">
+                <a:solidFill>
+                  <a:schemeClr val="tx1"/>
+                </a:solidFill>
+                <a:effectLst/>
+                <a:latin typeface="+mn-lt"/>
+                <a:ea typeface="+mn-ea"/>
+                <a:cs typeface="+mn-cs"/>
+              </a:rPr>
+              <a:t>      L2 L#7 (256KB) + L1d L#7 (32KB) + L1i L#7 (32KB) + Core L#7 + PU L#7 (P#7)</a:t>
+            </a:r>
+          </a:p>
+          <a:p>
+            <a:r>
+              <a:rPr lang="en-GB" sz="1200" kern="1200" dirty="0">
+                <a:solidFill>
+                  <a:schemeClr val="tx1"/>
+                </a:solidFill>
+                <a:effectLst/>
+                <a:latin typeface="+mn-lt"/>
+                <a:ea typeface="+mn-ea"/>
+                <a:cs typeface="+mn-cs"/>
+              </a:rPr>
+              <a:t>      L2 L#8 (256KB) + L1d L#8 (32KB) + L1i L#8 (32KB) + Core L#8 + PU L#8 (P#8)</a:t>
+            </a:r>
+          </a:p>
+          <a:p>
+            <a:r>
+              <a:rPr lang="en-GB" sz="1200" kern="1200" dirty="0">
+                <a:solidFill>
+                  <a:schemeClr val="tx1"/>
+                </a:solidFill>
+                <a:effectLst/>
+                <a:latin typeface="+mn-lt"/>
+                <a:ea typeface="+mn-ea"/>
+                <a:cs typeface="+mn-cs"/>
+              </a:rPr>
+              <a:t>      L2 L#9 (256KB) + L1d L#9 (32KB) + L1i L#9 (32KB) + Core L#9 + PU L#9 (P#9)</a:t>
+            </a:r>
+          </a:p>
+          <a:p>
+            <a:r>
+              <a:rPr lang="en-GB" sz="1200" kern="1200" dirty="0">
+                <a:solidFill>
+                  <a:schemeClr val="tx1"/>
+                </a:solidFill>
+                <a:effectLst/>
+                <a:latin typeface="+mn-lt"/>
+                <a:ea typeface="+mn-ea"/>
+                <a:cs typeface="+mn-cs"/>
+              </a:rPr>
+              <a:t>      L2 L#10 (256KB) + L1d L#10 (32KB) + L1i L#10 (32KB) + Core L#10 + PU L#10 (P#10)</a:t>
+            </a:r>
+          </a:p>
+          <a:p>
+            <a:r>
+              <a:rPr lang="en-GB" sz="1200" kern="1200" dirty="0">
+                <a:solidFill>
+                  <a:schemeClr val="tx1"/>
+                </a:solidFill>
+                <a:effectLst/>
+                <a:latin typeface="+mn-lt"/>
+                <a:ea typeface="+mn-ea"/>
+                <a:cs typeface="+mn-cs"/>
+              </a:rPr>
+              <a:t>      L2 L#11 (256KB) + L1d L#11 (32KB) + L1i L#11 (32KB) + Core L#11 + PU L#11 (P#11)</a:t>
+            </a:r>
+          </a:p>
+          <a:p>
+            <a:r>
+              <a:rPr lang="en-GB" sz="1200" kern="1200" dirty="0">
+                <a:solidFill>
+                  <a:schemeClr val="tx1"/>
+                </a:solidFill>
+                <a:effectLst/>
+                <a:latin typeface="+mn-lt"/>
+                <a:ea typeface="+mn-ea"/>
+                <a:cs typeface="+mn-cs"/>
+              </a:rPr>
+              <a:t>      L2 L#12 (256KB) + L1d L#12 (32KB) + L1i L#12 (32KB) + Core L#12 + PU L#12 (P#12)</a:t>
+            </a:r>
+          </a:p>
+          <a:p>
+            <a:r>
+              <a:rPr lang="en-GB" sz="1200" kern="1200" dirty="0">
+                <a:solidFill>
+                  <a:schemeClr val="tx1"/>
+                </a:solidFill>
+                <a:effectLst/>
+                <a:latin typeface="+mn-lt"/>
+                <a:ea typeface="+mn-ea"/>
+                <a:cs typeface="+mn-cs"/>
+              </a:rPr>
+              <a:t>      L2 L#13 (256KB) + L1d L#13 (32KB) + L1i L#13 (32KB) + Core L#13 + PU L#13 (P#13)</a:t>
+            </a:r>
+          </a:p>
+          <a:p>
+            <a:r>
+              <a:rPr lang="en-GB" sz="1200" kern="1200" dirty="0">
+                <a:solidFill>
+                  <a:schemeClr val="tx1"/>
+                </a:solidFill>
+                <a:effectLst/>
+                <a:latin typeface="+mn-lt"/>
+                <a:ea typeface="+mn-ea"/>
+                <a:cs typeface="+mn-cs"/>
+              </a:rPr>
+              <a:t>      L2 L#14 (256KB) + L1d L#14 (32KB) + L1i L#14 (32KB) + Core L#14 + PU L#14 (P#14)</a:t>
+            </a:r>
+          </a:p>
+          <a:p>
+            <a:r>
+              <a:rPr lang="en-GB" sz="1200" kern="1200" dirty="0">
+                <a:solidFill>
+                  <a:schemeClr val="tx1"/>
+                </a:solidFill>
+                <a:effectLst/>
+                <a:latin typeface="+mn-lt"/>
+                <a:ea typeface="+mn-ea"/>
+                <a:cs typeface="+mn-cs"/>
+              </a:rPr>
+              <a:t>      L2 L#15 (256KB) + L1d L#15 (32KB) + L1i L#15 (32KB) + Core L#15 + PU L#15 (P#15)</a:t>
+            </a:r>
+          </a:p>
+          <a:p>
+            <a:r>
+              <a:rPr lang="en-GB" sz="1200" kern="1200" dirty="0">
+                <a:solidFill>
+                  <a:schemeClr val="tx1"/>
+                </a:solidFill>
+                <a:effectLst/>
+                <a:latin typeface="+mn-lt"/>
+                <a:ea typeface="+mn-ea"/>
+                <a:cs typeface="+mn-cs"/>
+              </a:rPr>
+              <a:t>      L2 L#16 (256KB) + L1d L#16 (32KB) + L1i L#16 (32KB) + Core L#16 + PU L#16 (P#16)</a:t>
+            </a:r>
+          </a:p>
+          <a:p>
+            <a:r>
+              <a:rPr lang="en-GB" sz="1200" kern="1200" dirty="0">
+                <a:solidFill>
+                  <a:schemeClr val="tx1"/>
+                </a:solidFill>
+                <a:effectLst/>
+                <a:latin typeface="+mn-lt"/>
+                <a:ea typeface="+mn-ea"/>
+                <a:cs typeface="+mn-cs"/>
+              </a:rPr>
+              <a:t>      L2 L#17 (256KB) + L1d L#17 (32KB) + L1i L#17 (32KB) + Core L#17 + PU L#17 (P#17)</a:t>
+            </a:r>
+          </a:p>
+          <a:p>
+            <a:r>
+              <a:rPr lang="en-GB" sz="1200" kern="1200" dirty="0">
+                <a:solidFill>
+                  <a:schemeClr val="tx1"/>
+                </a:solidFill>
+                <a:effectLst/>
+                <a:latin typeface="+mn-lt"/>
+                <a:ea typeface="+mn-ea"/>
+                <a:cs typeface="+mn-cs"/>
+              </a:rPr>
+              <a:t>    </a:t>
+            </a:r>
+            <a:r>
+              <a:rPr lang="en-GB" sz="1200" kern="1200" dirty="0" err="1">
+                <a:solidFill>
+                  <a:schemeClr val="tx1"/>
+                </a:solidFill>
+                <a:effectLst/>
+                <a:latin typeface="+mn-lt"/>
+                <a:ea typeface="+mn-ea"/>
+                <a:cs typeface="+mn-cs"/>
+              </a:rPr>
+              <a:t>HostBridge</a:t>
+            </a:r>
+            <a:r>
+              <a:rPr lang="en-GB" sz="1200" kern="1200" dirty="0">
+                <a:solidFill>
+                  <a:schemeClr val="tx1"/>
+                </a:solidFill>
+                <a:effectLst/>
+                <a:latin typeface="+mn-lt"/>
+                <a:ea typeface="+mn-ea"/>
+                <a:cs typeface="+mn-cs"/>
+              </a:rPr>
+              <a:t> L#0</a:t>
+            </a:r>
+          </a:p>
+          <a:p>
+            <a:r>
+              <a:rPr lang="en-GB" sz="1200" kern="1200" dirty="0">
+                <a:solidFill>
+                  <a:schemeClr val="tx1"/>
+                </a:solidFill>
+                <a:effectLst/>
+                <a:latin typeface="+mn-lt"/>
+                <a:ea typeface="+mn-ea"/>
+                <a:cs typeface="+mn-cs"/>
+              </a:rPr>
+              <a:t>      </a:t>
+            </a:r>
+            <a:r>
+              <a:rPr lang="en-GB" sz="1200" kern="1200" dirty="0" err="1">
+                <a:solidFill>
+                  <a:schemeClr val="tx1"/>
+                </a:solidFill>
+                <a:effectLst/>
+                <a:latin typeface="+mn-lt"/>
+                <a:ea typeface="+mn-ea"/>
+                <a:cs typeface="+mn-cs"/>
+              </a:rPr>
+              <a:t>PCIBridge</a:t>
+            </a:r>
+            <a:endParaRPr lang="en-GB" sz="1200" kern="1200" dirty="0">
+              <a:solidFill>
+                <a:schemeClr val="tx1"/>
+              </a:solidFill>
+              <a:effectLst/>
+              <a:latin typeface="+mn-lt"/>
+              <a:ea typeface="+mn-ea"/>
+              <a:cs typeface="+mn-cs"/>
+            </a:endParaRPr>
+          </a:p>
+          <a:p>
+            <a:r>
+              <a:rPr lang="en-GB" sz="1200" kern="1200" dirty="0">
+                <a:solidFill>
+                  <a:schemeClr val="tx1"/>
+                </a:solidFill>
+                <a:effectLst/>
+                <a:latin typeface="+mn-lt"/>
+                <a:ea typeface="+mn-ea"/>
+                <a:cs typeface="+mn-cs"/>
+              </a:rPr>
+              <a:t>        PCI 1000:005d</a:t>
+            </a:r>
+          </a:p>
+          <a:p>
+            <a:r>
+              <a:rPr lang="en-GB" sz="1200" kern="1200" dirty="0">
+                <a:solidFill>
+                  <a:schemeClr val="tx1"/>
+                </a:solidFill>
+                <a:effectLst/>
+                <a:latin typeface="+mn-lt"/>
+                <a:ea typeface="+mn-ea"/>
+                <a:cs typeface="+mn-cs"/>
+              </a:rPr>
+              <a:t>          Block(Disk) L#0 "</a:t>
+            </a:r>
+            <a:r>
+              <a:rPr lang="en-GB" sz="1200" kern="1200" dirty="0" err="1">
+                <a:solidFill>
+                  <a:schemeClr val="tx1"/>
+                </a:solidFill>
+                <a:effectLst/>
+                <a:latin typeface="+mn-lt"/>
+                <a:ea typeface="+mn-ea"/>
+                <a:cs typeface="+mn-cs"/>
+              </a:rPr>
+              <a:t>sda</a:t>
+            </a:r>
+            <a:r>
+              <a:rPr lang="en-GB" sz="1200" kern="1200" dirty="0">
+                <a:solidFill>
+                  <a:schemeClr val="tx1"/>
+                </a:solidFill>
+                <a:effectLst/>
+                <a:latin typeface="+mn-lt"/>
+                <a:ea typeface="+mn-ea"/>
+                <a:cs typeface="+mn-cs"/>
+              </a:rPr>
+              <a:t>"</a:t>
+            </a:r>
+          </a:p>
+          <a:p>
+            <a:r>
+              <a:rPr lang="en-GB" sz="1200" kern="1200" dirty="0">
+                <a:solidFill>
+                  <a:schemeClr val="tx1"/>
+                </a:solidFill>
+                <a:effectLst/>
+                <a:latin typeface="+mn-lt"/>
+                <a:ea typeface="+mn-ea"/>
+                <a:cs typeface="+mn-cs"/>
+              </a:rPr>
+              <a:t>      </a:t>
+            </a:r>
+            <a:r>
+              <a:rPr lang="en-GB" sz="1200" kern="1200" dirty="0" err="1">
+                <a:solidFill>
+                  <a:schemeClr val="tx1"/>
+                </a:solidFill>
+                <a:effectLst/>
+                <a:latin typeface="+mn-lt"/>
+                <a:ea typeface="+mn-ea"/>
+                <a:cs typeface="+mn-cs"/>
+              </a:rPr>
+              <a:t>PCIBridge</a:t>
+            </a:r>
+            <a:endParaRPr lang="en-GB" sz="1200" kern="1200" dirty="0">
+              <a:solidFill>
+                <a:schemeClr val="tx1"/>
+              </a:solidFill>
+              <a:effectLst/>
+              <a:latin typeface="+mn-lt"/>
+              <a:ea typeface="+mn-ea"/>
+              <a:cs typeface="+mn-cs"/>
+            </a:endParaRPr>
+          </a:p>
+          <a:p>
+            <a:r>
+              <a:rPr lang="en-GB" sz="1200" kern="1200" dirty="0">
+                <a:solidFill>
+                  <a:schemeClr val="tx1"/>
+                </a:solidFill>
+                <a:effectLst/>
+                <a:latin typeface="+mn-lt"/>
+                <a:ea typeface="+mn-ea"/>
+                <a:cs typeface="+mn-cs"/>
+              </a:rPr>
+              <a:t>        PCI 8086:1528</a:t>
+            </a:r>
+          </a:p>
+          <a:p>
+            <a:r>
+              <a:rPr lang="en-GB" sz="1200" kern="1200" dirty="0">
+                <a:solidFill>
+                  <a:schemeClr val="tx1"/>
+                </a:solidFill>
+                <a:effectLst/>
+                <a:latin typeface="+mn-lt"/>
+                <a:ea typeface="+mn-ea"/>
+                <a:cs typeface="+mn-cs"/>
+              </a:rPr>
+              <a:t>          Net L#1 "eno1"</a:t>
+            </a:r>
+          </a:p>
+          <a:p>
+            <a:r>
+              <a:rPr lang="en-GB" sz="1200" kern="1200" dirty="0">
+                <a:solidFill>
+                  <a:schemeClr val="tx1"/>
+                </a:solidFill>
+                <a:effectLst/>
+                <a:latin typeface="+mn-lt"/>
+                <a:ea typeface="+mn-ea"/>
+                <a:cs typeface="+mn-cs"/>
+              </a:rPr>
+              <a:t>        PCI 8086:1528</a:t>
+            </a:r>
+          </a:p>
+          <a:p>
+            <a:r>
+              <a:rPr lang="en-GB" sz="1200" kern="1200" dirty="0">
+                <a:solidFill>
+                  <a:schemeClr val="tx1"/>
+                </a:solidFill>
+                <a:effectLst/>
+                <a:latin typeface="+mn-lt"/>
+                <a:ea typeface="+mn-ea"/>
+                <a:cs typeface="+mn-cs"/>
+              </a:rPr>
+              <a:t>          Net L#2 "eno2"</a:t>
+            </a:r>
+          </a:p>
+          <a:p>
+            <a:r>
+              <a:rPr lang="en-GB" sz="1200" kern="1200" dirty="0">
+                <a:solidFill>
+                  <a:schemeClr val="tx1"/>
+                </a:solidFill>
+                <a:effectLst/>
+                <a:latin typeface="+mn-lt"/>
+                <a:ea typeface="+mn-ea"/>
+                <a:cs typeface="+mn-cs"/>
+              </a:rPr>
+              <a:t>      </a:t>
+            </a:r>
+            <a:r>
+              <a:rPr lang="en-GB" sz="1200" kern="1200" dirty="0" err="1">
+                <a:solidFill>
+                  <a:schemeClr val="tx1"/>
+                </a:solidFill>
+                <a:effectLst/>
+                <a:latin typeface="+mn-lt"/>
+                <a:ea typeface="+mn-ea"/>
+                <a:cs typeface="+mn-cs"/>
+              </a:rPr>
+              <a:t>PCIBridge</a:t>
+            </a:r>
+            <a:endParaRPr lang="en-GB" sz="1200" kern="1200" dirty="0">
+              <a:solidFill>
+                <a:schemeClr val="tx1"/>
+              </a:solidFill>
+              <a:effectLst/>
+              <a:latin typeface="+mn-lt"/>
+              <a:ea typeface="+mn-ea"/>
+              <a:cs typeface="+mn-cs"/>
+            </a:endParaRPr>
+          </a:p>
+          <a:p>
+            <a:r>
+              <a:rPr lang="en-GB" sz="1200" kern="1200" dirty="0">
+                <a:solidFill>
+                  <a:schemeClr val="tx1"/>
+                </a:solidFill>
+                <a:effectLst/>
+                <a:latin typeface="+mn-lt"/>
+                <a:ea typeface="+mn-ea"/>
+                <a:cs typeface="+mn-cs"/>
+              </a:rPr>
+              <a:t>        PCI 15b3:1013</a:t>
+            </a:r>
+          </a:p>
+          <a:p>
+            <a:r>
+              <a:rPr lang="en-GB" sz="1200" kern="1200" dirty="0">
+                <a:solidFill>
+                  <a:schemeClr val="tx1"/>
+                </a:solidFill>
+                <a:effectLst/>
+                <a:latin typeface="+mn-lt"/>
+                <a:ea typeface="+mn-ea"/>
+                <a:cs typeface="+mn-cs"/>
+              </a:rPr>
+              <a:t>          Net L#3 "ib0"</a:t>
+            </a:r>
+          </a:p>
+          <a:p>
+            <a:r>
+              <a:rPr lang="en-GB" sz="1200" kern="1200" dirty="0">
+                <a:solidFill>
+                  <a:schemeClr val="tx1"/>
+                </a:solidFill>
+                <a:effectLst/>
+                <a:latin typeface="+mn-lt"/>
+                <a:ea typeface="+mn-ea"/>
+                <a:cs typeface="+mn-cs"/>
+              </a:rPr>
+              <a:t>          </a:t>
+            </a:r>
+            <a:r>
+              <a:rPr lang="en-GB" sz="1200" kern="1200" dirty="0" err="1">
+                <a:solidFill>
+                  <a:schemeClr val="tx1"/>
+                </a:solidFill>
+                <a:effectLst/>
+                <a:latin typeface="+mn-lt"/>
+                <a:ea typeface="+mn-ea"/>
+                <a:cs typeface="+mn-cs"/>
+              </a:rPr>
+              <a:t>OpenFabrics</a:t>
+            </a:r>
+            <a:r>
+              <a:rPr lang="en-GB" sz="1200" kern="1200" dirty="0">
+                <a:solidFill>
+                  <a:schemeClr val="tx1"/>
+                </a:solidFill>
+                <a:effectLst/>
+                <a:latin typeface="+mn-lt"/>
+                <a:ea typeface="+mn-ea"/>
+                <a:cs typeface="+mn-cs"/>
+              </a:rPr>
+              <a:t> L#4 "mlx5_0"</a:t>
+            </a:r>
+          </a:p>
+          <a:p>
+            <a:r>
+              <a:rPr lang="en-GB" sz="1200" kern="1200" dirty="0">
+                <a:solidFill>
+                  <a:schemeClr val="tx1"/>
+                </a:solidFill>
+                <a:effectLst/>
+                <a:latin typeface="+mn-lt"/>
+                <a:ea typeface="+mn-ea"/>
+                <a:cs typeface="+mn-cs"/>
+              </a:rPr>
+              <a:t>      PCI 8086:8d62</a:t>
+            </a:r>
+          </a:p>
+          <a:p>
+            <a:r>
+              <a:rPr lang="en-GB" sz="1200" kern="1200" dirty="0">
+                <a:solidFill>
+                  <a:schemeClr val="tx1"/>
+                </a:solidFill>
+                <a:effectLst/>
+                <a:latin typeface="+mn-lt"/>
+                <a:ea typeface="+mn-ea"/>
+                <a:cs typeface="+mn-cs"/>
+              </a:rPr>
+              <a:t>      </a:t>
+            </a:r>
+            <a:r>
+              <a:rPr lang="en-GB" sz="1200" kern="1200" dirty="0" err="1">
+                <a:solidFill>
+                  <a:schemeClr val="tx1"/>
+                </a:solidFill>
+                <a:effectLst/>
+                <a:latin typeface="+mn-lt"/>
+                <a:ea typeface="+mn-ea"/>
+                <a:cs typeface="+mn-cs"/>
+              </a:rPr>
+              <a:t>PCIBridge</a:t>
+            </a:r>
+            <a:endParaRPr lang="en-GB" sz="1200" kern="1200" dirty="0">
+              <a:solidFill>
+                <a:schemeClr val="tx1"/>
+              </a:solidFill>
+              <a:effectLst/>
+              <a:latin typeface="+mn-lt"/>
+              <a:ea typeface="+mn-ea"/>
+              <a:cs typeface="+mn-cs"/>
+            </a:endParaRPr>
+          </a:p>
+          <a:p>
+            <a:r>
+              <a:rPr lang="en-GB" sz="1200" kern="1200" dirty="0">
+                <a:solidFill>
+                  <a:schemeClr val="tx1"/>
+                </a:solidFill>
+                <a:effectLst/>
+                <a:latin typeface="+mn-lt"/>
+                <a:ea typeface="+mn-ea"/>
+                <a:cs typeface="+mn-cs"/>
+              </a:rPr>
+              <a:t>        PCI 102b:0522</a:t>
+            </a:r>
+          </a:p>
+          <a:p>
+            <a:r>
+              <a:rPr lang="en-GB" sz="1200" kern="1200" dirty="0">
+                <a:solidFill>
+                  <a:schemeClr val="tx1"/>
+                </a:solidFill>
+                <a:effectLst/>
+                <a:latin typeface="+mn-lt"/>
+                <a:ea typeface="+mn-ea"/>
+                <a:cs typeface="+mn-cs"/>
+              </a:rPr>
+              <a:t>          GPU L#5 "card0"</a:t>
+            </a:r>
+          </a:p>
+          <a:p>
+            <a:r>
+              <a:rPr lang="en-GB" sz="1200" kern="1200" dirty="0">
+                <a:solidFill>
+                  <a:schemeClr val="tx1"/>
+                </a:solidFill>
+                <a:effectLst/>
+                <a:latin typeface="+mn-lt"/>
+                <a:ea typeface="+mn-ea"/>
+                <a:cs typeface="+mn-cs"/>
+              </a:rPr>
+              <a:t>          GPU L#6 "controlD64"</a:t>
+            </a:r>
+          </a:p>
+          <a:p>
+            <a:r>
+              <a:rPr lang="en-GB" sz="1200" kern="1200" dirty="0">
+                <a:solidFill>
+                  <a:schemeClr val="tx1"/>
+                </a:solidFill>
+                <a:effectLst/>
+                <a:latin typeface="+mn-lt"/>
+                <a:ea typeface="+mn-ea"/>
+                <a:cs typeface="+mn-cs"/>
+              </a:rPr>
+              <a:t>      PCI 8086:8d02</a:t>
+            </a:r>
+          </a:p>
+          <a:p>
+            <a:r>
+              <a:rPr lang="en-GB" sz="1200" kern="1200" dirty="0">
+                <a:solidFill>
+                  <a:schemeClr val="tx1"/>
+                </a:solidFill>
+                <a:effectLst/>
+                <a:latin typeface="+mn-lt"/>
+                <a:ea typeface="+mn-ea"/>
+                <a:cs typeface="+mn-cs"/>
+              </a:rPr>
+              <a:t>  </a:t>
+            </a:r>
+            <a:r>
+              <a:rPr lang="en-GB" sz="1200" kern="1200" dirty="0" err="1">
+                <a:solidFill>
+                  <a:schemeClr val="tx1"/>
+                </a:solidFill>
+                <a:effectLst/>
+                <a:latin typeface="+mn-lt"/>
+                <a:ea typeface="+mn-ea"/>
+                <a:cs typeface="+mn-cs"/>
+              </a:rPr>
+              <a:t>NUMANode</a:t>
+            </a:r>
+            <a:r>
+              <a:rPr lang="en-GB" sz="1200" kern="1200" dirty="0">
+                <a:solidFill>
+                  <a:schemeClr val="tx1"/>
+                </a:solidFill>
+                <a:effectLst/>
+                <a:latin typeface="+mn-lt"/>
+                <a:ea typeface="+mn-ea"/>
+                <a:cs typeface="+mn-cs"/>
+              </a:rPr>
+              <a:t> L#1 (P#1 64GB)</a:t>
+            </a:r>
+          </a:p>
+          <a:p>
+            <a:r>
+              <a:rPr lang="en-GB" sz="1200" kern="1200" dirty="0">
+                <a:solidFill>
+                  <a:schemeClr val="tx1"/>
+                </a:solidFill>
+                <a:effectLst/>
+                <a:latin typeface="+mn-lt"/>
+                <a:ea typeface="+mn-ea"/>
+                <a:cs typeface="+mn-cs"/>
+              </a:rPr>
+              <a:t>    Package L#1 + L3 L#1 (45MB)</a:t>
+            </a:r>
+          </a:p>
+          <a:p>
+            <a:r>
+              <a:rPr lang="en-GB" sz="1200" kern="1200" dirty="0">
+                <a:solidFill>
+                  <a:schemeClr val="tx1"/>
+                </a:solidFill>
+                <a:effectLst/>
+                <a:latin typeface="+mn-lt"/>
+                <a:ea typeface="+mn-ea"/>
+                <a:cs typeface="+mn-cs"/>
+              </a:rPr>
+              <a:t>      L2 L#18 (256KB) + L1d L#18 (32KB) + L1i L#18 (32KB) + Core L#18 + PU L#18 (P#18)</a:t>
+            </a:r>
+          </a:p>
+          <a:p>
+            <a:r>
+              <a:rPr lang="en-GB" sz="1200" kern="1200" dirty="0">
+                <a:solidFill>
+                  <a:schemeClr val="tx1"/>
+                </a:solidFill>
+                <a:effectLst/>
+                <a:latin typeface="+mn-lt"/>
+                <a:ea typeface="+mn-ea"/>
+                <a:cs typeface="+mn-cs"/>
+              </a:rPr>
+              <a:t>      L2 L#19 (256KB) + L1d L#19 (32KB) + L1i L#19 (32KB) + Core L#19 + PU L#19 (P#19)</a:t>
+            </a:r>
+          </a:p>
+          <a:p>
+            <a:r>
+              <a:rPr lang="en-GB" sz="1200" kern="1200" dirty="0">
+                <a:solidFill>
+                  <a:schemeClr val="tx1"/>
+                </a:solidFill>
+                <a:effectLst/>
+                <a:latin typeface="+mn-lt"/>
+                <a:ea typeface="+mn-ea"/>
+                <a:cs typeface="+mn-cs"/>
+              </a:rPr>
+              <a:t>      L2 L#20 (256KB) + L1d L#20 (32KB) + L1i L#20 (32KB) + Core L#20 + PU L#20 (P#20)</a:t>
+            </a:r>
+          </a:p>
+          <a:p>
+            <a:r>
+              <a:rPr lang="en-GB" sz="1200" kern="1200" dirty="0">
+                <a:solidFill>
+                  <a:schemeClr val="tx1"/>
+                </a:solidFill>
+                <a:effectLst/>
+                <a:latin typeface="+mn-lt"/>
+                <a:ea typeface="+mn-ea"/>
+                <a:cs typeface="+mn-cs"/>
+              </a:rPr>
+              <a:t>      L2 L#21 (256KB) + L1d L#21 (32KB) + L1i L#21 (32KB) + Core L#21 + PU L#21 (P#21)</a:t>
+            </a:r>
+          </a:p>
+          <a:p>
+            <a:r>
+              <a:rPr lang="en-GB" sz="1200" kern="1200" dirty="0">
+                <a:solidFill>
+                  <a:schemeClr val="tx1"/>
+                </a:solidFill>
+                <a:effectLst/>
+                <a:latin typeface="+mn-lt"/>
+                <a:ea typeface="+mn-ea"/>
+                <a:cs typeface="+mn-cs"/>
+              </a:rPr>
+              <a:t>      L2 L#22 (256KB) + L1d L#22 (32KB) + L1i L#22 (32KB) + Core L#22 + PU L#22 (P#22)</a:t>
+            </a:r>
+          </a:p>
+          <a:p>
+            <a:r>
+              <a:rPr lang="en-GB" sz="1200" kern="1200" dirty="0">
+                <a:solidFill>
+                  <a:schemeClr val="tx1"/>
+                </a:solidFill>
+                <a:effectLst/>
+                <a:latin typeface="+mn-lt"/>
+                <a:ea typeface="+mn-ea"/>
+                <a:cs typeface="+mn-cs"/>
+              </a:rPr>
+              <a:t>      L2 L#23 (256KB) + L1d L#23 (32KB) + L1i L#23 (32KB) + Core L#23 + PU L#23 (P#23)</a:t>
+            </a:r>
+          </a:p>
+          <a:p>
+            <a:r>
+              <a:rPr lang="en-GB" sz="1200" kern="1200" dirty="0">
+                <a:solidFill>
+                  <a:schemeClr val="tx1"/>
+                </a:solidFill>
+                <a:effectLst/>
+                <a:latin typeface="+mn-lt"/>
+                <a:ea typeface="+mn-ea"/>
+                <a:cs typeface="+mn-cs"/>
+              </a:rPr>
+              <a:t>      L2 L#24 (256KB) + L1d L#24 (32KB) + L1i L#24 (32KB) + Core L#24 + PU L#24 (P#24)</a:t>
+            </a:r>
+          </a:p>
+          <a:p>
+            <a:r>
+              <a:rPr lang="en-GB" sz="1200" kern="1200" dirty="0">
+                <a:solidFill>
+                  <a:schemeClr val="tx1"/>
+                </a:solidFill>
+                <a:effectLst/>
+                <a:latin typeface="+mn-lt"/>
+                <a:ea typeface="+mn-ea"/>
+                <a:cs typeface="+mn-cs"/>
+              </a:rPr>
+              <a:t>      L2 L#25 (256KB) + L1d L#25 (32KB) + L1i L#25 (32KB) + Core L#25 + PU L#25 (P#25)</a:t>
+            </a:r>
+          </a:p>
+          <a:p>
+            <a:r>
+              <a:rPr lang="en-GB" sz="1200" kern="1200" dirty="0">
+                <a:solidFill>
+                  <a:schemeClr val="tx1"/>
+                </a:solidFill>
+                <a:effectLst/>
+                <a:latin typeface="+mn-lt"/>
+                <a:ea typeface="+mn-ea"/>
+                <a:cs typeface="+mn-cs"/>
+              </a:rPr>
+              <a:t>      L2 L#26 (256KB) + L1d L#26 (32KB) + L1i L#26 (32KB) + Core L#26 + PU L#26 (P#26)</a:t>
+            </a:r>
+          </a:p>
+          <a:p>
+            <a:r>
+              <a:rPr lang="en-GB" sz="1200" kern="1200" dirty="0">
+                <a:solidFill>
+                  <a:schemeClr val="tx1"/>
+                </a:solidFill>
+                <a:effectLst/>
+                <a:latin typeface="+mn-lt"/>
+                <a:ea typeface="+mn-ea"/>
+                <a:cs typeface="+mn-cs"/>
+              </a:rPr>
+              <a:t>      L2 L#27 (256KB) + L1d L#27 (32KB) + L1i L#27 (32KB) + Core L#27 + PU L#27 (P#27)</a:t>
+            </a:r>
+          </a:p>
+          <a:p>
+            <a:r>
+              <a:rPr lang="en-GB" sz="1200" kern="1200" dirty="0">
+                <a:solidFill>
+                  <a:schemeClr val="tx1"/>
+                </a:solidFill>
+                <a:effectLst/>
+                <a:latin typeface="+mn-lt"/>
+                <a:ea typeface="+mn-ea"/>
+                <a:cs typeface="+mn-cs"/>
+              </a:rPr>
+              <a:t>      L2 L#28 (256KB) + L1d L#28 (32KB) + L1i L#28 (32KB) + Core L#28 + PU L#28 (P#28)</a:t>
+            </a:r>
+          </a:p>
+          <a:p>
+            <a:r>
+              <a:rPr lang="en-GB" sz="1200" kern="1200" dirty="0">
+                <a:solidFill>
+                  <a:schemeClr val="tx1"/>
+                </a:solidFill>
+                <a:effectLst/>
+                <a:latin typeface="+mn-lt"/>
+                <a:ea typeface="+mn-ea"/>
+                <a:cs typeface="+mn-cs"/>
+              </a:rPr>
+              <a:t>      L2 L#29 (256KB) + L1d L#29 (32KB) + L1i L#29 (32KB) + Core L#29 + PU L#29 (P#29)</a:t>
+            </a:r>
+          </a:p>
+          <a:p>
+            <a:r>
+              <a:rPr lang="en-GB" sz="1200" kern="1200" dirty="0">
+                <a:solidFill>
+                  <a:schemeClr val="tx1"/>
+                </a:solidFill>
+                <a:effectLst/>
+                <a:latin typeface="+mn-lt"/>
+                <a:ea typeface="+mn-ea"/>
+                <a:cs typeface="+mn-cs"/>
+              </a:rPr>
+              <a:t>      L2 L#30 (256KB) + L1d L#30 (32KB) + L1i L#30 (32KB) + Core L#30 + PU L#30 (P#30)</a:t>
+            </a:r>
+          </a:p>
+          <a:p>
+            <a:r>
+              <a:rPr lang="en-GB" sz="1200" kern="1200" dirty="0">
+                <a:solidFill>
+                  <a:schemeClr val="tx1"/>
+                </a:solidFill>
+                <a:effectLst/>
+                <a:latin typeface="+mn-lt"/>
+                <a:ea typeface="+mn-ea"/>
+                <a:cs typeface="+mn-cs"/>
+              </a:rPr>
+              <a:t>      L2 L#31 (256KB) + L1d L#31 (32KB) + L1i L#31 (32KB) + Core L#31 + PU L#31 (P#31)</a:t>
+            </a:r>
+          </a:p>
+          <a:p>
+            <a:r>
+              <a:rPr lang="en-GB" sz="1200" kern="1200" dirty="0">
+                <a:solidFill>
+                  <a:schemeClr val="tx1"/>
+                </a:solidFill>
+                <a:effectLst/>
+                <a:latin typeface="+mn-lt"/>
+                <a:ea typeface="+mn-ea"/>
+                <a:cs typeface="+mn-cs"/>
+              </a:rPr>
+              <a:t>      L2 L#32 (256KB) + L1d L#32 (32KB) + L1i L#32 (32KB) + Core L#32 + PU L#32 (P#32)</a:t>
+            </a:r>
+          </a:p>
+          <a:p>
+            <a:r>
+              <a:rPr lang="en-GB" sz="1200" kern="1200" dirty="0">
+                <a:solidFill>
+                  <a:schemeClr val="tx1"/>
+                </a:solidFill>
+                <a:effectLst/>
+                <a:latin typeface="+mn-lt"/>
+                <a:ea typeface="+mn-ea"/>
+                <a:cs typeface="+mn-cs"/>
+              </a:rPr>
+              <a:t>      L2 L#33 (256KB) + L1d L#33 (32KB) + L1i L#33 (32KB) + Core L#33 + PU L#33 (P#33)</a:t>
+            </a:r>
+          </a:p>
+          <a:p>
+            <a:r>
+              <a:rPr lang="en-GB" sz="1200" kern="1200" dirty="0">
+                <a:solidFill>
+                  <a:schemeClr val="tx1"/>
+                </a:solidFill>
+                <a:effectLst/>
+                <a:latin typeface="+mn-lt"/>
+                <a:ea typeface="+mn-ea"/>
+                <a:cs typeface="+mn-cs"/>
+              </a:rPr>
+              <a:t>      L2 L#34 (256KB) + L1d L#34 (32KB) + L1i L#34 (32KB) + Core L#34 + PU L#34 (P#34)</a:t>
+            </a:r>
+          </a:p>
+          <a:p>
+            <a:r>
+              <a:rPr lang="en-GB" sz="1200" kern="1200" dirty="0">
+                <a:solidFill>
+                  <a:schemeClr val="tx1"/>
+                </a:solidFill>
+                <a:effectLst/>
+                <a:latin typeface="+mn-lt"/>
+                <a:ea typeface="+mn-ea"/>
+                <a:cs typeface="+mn-cs"/>
+              </a:rPr>
+              <a:t>      L2 L#35 (256KB) + L1d L#35 (32KB) + L1i L#35 (32KB) + Core L#35 + PU L#35 (P#35)</a:t>
+            </a:r>
+          </a:p>
+          <a:p>
+            <a:r>
+              <a:rPr lang="en-GB" sz="1200" kern="1200" dirty="0">
+                <a:solidFill>
+                  <a:schemeClr val="tx1"/>
+                </a:solidFill>
+                <a:effectLst/>
+                <a:latin typeface="+mn-lt"/>
+                <a:ea typeface="+mn-ea"/>
+                <a:cs typeface="+mn-cs"/>
+              </a:rPr>
+              <a:t>    </a:t>
+            </a:r>
+            <a:r>
+              <a:rPr lang="en-GB" sz="1200" kern="1200" dirty="0" err="1">
+                <a:solidFill>
+                  <a:schemeClr val="tx1"/>
+                </a:solidFill>
+                <a:effectLst/>
+                <a:latin typeface="+mn-lt"/>
+                <a:ea typeface="+mn-ea"/>
+                <a:cs typeface="+mn-cs"/>
+              </a:rPr>
+              <a:t>HostBridge</a:t>
+            </a:r>
+            <a:r>
+              <a:rPr lang="en-GB" sz="1200" kern="1200" dirty="0">
+                <a:solidFill>
+                  <a:schemeClr val="tx1"/>
+                </a:solidFill>
+                <a:effectLst/>
+                <a:latin typeface="+mn-lt"/>
+                <a:ea typeface="+mn-ea"/>
+                <a:cs typeface="+mn-cs"/>
+              </a:rPr>
+              <a:t> L#5</a:t>
+            </a:r>
+          </a:p>
+          <a:p>
+            <a:r>
+              <a:rPr lang="en-GB" sz="1200" kern="1200" dirty="0">
+                <a:solidFill>
+                  <a:schemeClr val="tx1"/>
+                </a:solidFill>
+                <a:effectLst/>
+                <a:latin typeface="+mn-lt"/>
+                <a:ea typeface="+mn-ea"/>
+                <a:cs typeface="+mn-cs"/>
+              </a:rPr>
+              <a:t>      </a:t>
+            </a:r>
+            <a:r>
+              <a:rPr lang="en-GB" sz="1200" kern="1200" dirty="0" err="1">
+                <a:solidFill>
+                  <a:schemeClr val="tx1"/>
+                </a:solidFill>
+                <a:effectLst/>
+                <a:latin typeface="+mn-lt"/>
+                <a:ea typeface="+mn-ea"/>
+                <a:cs typeface="+mn-cs"/>
+              </a:rPr>
+              <a:t>PCIBridge</a:t>
+            </a:r>
+            <a:endParaRPr lang="en-GB" sz="1200" kern="1200" dirty="0">
+              <a:solidFill>
+                <a:schemeClr val="tx1"/>
+              </a:solidFill>
+              <a:effectLst/>
+              <a:latin typeface="+mn-lt"/>
+              <a:ea typeface="+mn-ea"/>
+              <a:cs typeface="+mn-cs"/>
+            </a:endParaRPr>
+          </a:p>
+          <a:p>
+            <a:r>
+              <a:rPr lang="en-GB" sz="1200" kern="1200" dirty="0">
+                <a:solidFill>
+                  <a:schemeClr val="tx1"/>
+                </a:solidFill>
+                <a:effectLst/>
+                <a:latin typeface="+mn-lt"/>
+                <a:ea typeface="+mn-ea"/>
+                <a:cs typeface="+mn-cs"/>
+              </a:rPr>
+              <a:t>        PCI 15b3:1003</a:t>
+            </a:r>
+          </a:p>
+          <a:p>
+            <a:r>
+              <a:rPr lang="en-GB" sz="1200" kern="1200" dirty="0">
+                <a:solidFill>
+                  <a:schemeClr val="tx1"/>
+                </a:solidFill>
+                <a:effectLst/>
+                <a:latin typeface="+mn-lt"/>
+                <a:ea typeface="+mn-ea"/>
+                <a:cs typeface="+mn-cs"/>
+              </a:rPr>
+              <a:t>          Net L#7 "ens786d1"</a:t>
+            </a:r>
+          </a:p>
+          <a:p>
+            <a:r>
+              <a:rPr lang="en-GB" sz="1200" kern="1200" dirty="0">
+                <a:solidFill>
+                  <a:schemeClr val="tx1"/>
+                </a:solidFill>
+                <a:effectLst/>
+                <a:latin typeface="+mn-lt"/>
+                <a:ea typeface="+mn-ea"/>
+                <a:cs typeface="+mn-cs"/>
+              </a:rPr>
+              <a:t>          Net L#8 "ens786"</a:t>
+            </a:r>
+          </a:p>
+          <a:p>
+            <a:r>
+              <a:rPr lang="en-GB" sz="1200" kern="1200" dirty="0">
+                <a:solidFill>
+                  <a:schemeClr val="tx1"/>
+                </a:solidFill>
+                <a:effectLst/>
+                <a:latin typeface="+mn-lt"/>
+                <a:ea typeface="+mn-ea"/>
+                <a:cs typeface="+mn-cs"/>
+              </a:rPr>
+              <a:t>          </a:t>
+            </a:r>
+            <a:r>
+              <a:rPr lang="en-GB" sz="1200" kern="1200" dirty="0" err="1">
+                <a:solidFill>
+                  <a:schemeClr val="tx1"/>
+                </a:solidFill>
+                <a:effectLst/>
+                <a:latin typeface="+mn-lt"/>
+                <a:ea typeface="+mn-ea"/>
+                <a:cs typeface="+mn-cs"/>
+              </a:rPr>
+              <a:t>OpenFabrics</a:t>
+            </a:r>
+            <a:r>
+              <a:rPr lang="en-GB" sz="1200" kern="1200" dirty="0">
+                <a:solidFill>
+                  <a:schemeClr val="tx1"/>
+                </a:solidFill>
+                <a:effectLst/>
+                <a:latin typeface="+mn-lt"/>
+                <a:ea typeface="+mn-ea"/>
+                <a:cs typeface="+mn-cs"/>
+              </a:rPr>
+              <a:t> L#9 "mlx4_0"</a:t>
+            </a:r>
+          </a:p>
+          <a:p>
+            <a:pPr marL="0" indent="0">
+              <a:buFontTx/>
+              <a:buNone/>
+            </a:pPr>
+            <a:endParaRPr lang="en-US" dirty="0"/>
           </a:p>
         </p:txBody>
       </p:sp>
@@ -749,7 +2133,7 @@
             <a:spLocks noGrp="1"/>
           </p:cNvSpPr>
           <p:nvPr>
-            <p:ph type="sldNum" sz="quarter" idx="10"/>
+            <p:ph type="sldNum" sz="quarter" idx="5"/>
           </p:nvPr>
         </p:nvSpPr>
         <p:spPr/>
@@ -757,10 +2141,9 @@
           <a:bodyPr/>
           <a:lstStyle/>
           <a:p>
-            <a:fld id="{9B3F2D69-97A9-4C41-91BD-6A22F8270148}" type="slidenum">
+            <a:fld id="{18B7B4CC-BAF8-A446-A722-9B4FBD8C20C1}" type="slidenum">
               <a:rPr lang="en-GB" smtClean="0"/>
-              <a:pPr/>
-              <a:t>15</a:t>
+              <a:t>14</a:t>
             </a:fld>
             <a:endParaRPr lang="en-GB"/>
           </a:p>
@@ -769,7 +2152,7 @@
     </p:spTree>
     <p:extLst>
       <p:ext uri="{BB962C8B-B14F-4D97-AF65-F5344CB8AC3E}">
-        <p14:creationId xmlns:p14="http://schemas.microsoft.com/office/powerpoint/2010/main" val="88261932"/>
+        <p14:creationId xmlns:p14="http://schemas.microsoft.com/office/powerpoint/2010/main" val="114002930"/>
       </p:ext>
     </p:extLst>
   </p:cSld>
@@ -824,14 +2207,15 @@
           <a:lstStyle/>
           <a:p>
             <a:r>
-              <a:rPr lang="en-US" dirty="0"/>
-              <a:t>OpenCL</a:t>
-            </a:r>
-            <a:r>
-              <a:rPr lang="en-US" baseline="0" dirty="0"/>
-              <a:t> 2.0 shared virtual memory improves on this</a:t>
-            </a:r>
-            <a:endParaRPr lang="en-US" dirty="0"/>
+              <a:rPr lang="en-GB" dirty="0"/>
+              <a:t>CL_DEVICE_PARTITION_BY_AFFINITY_DOMAIN would be ideal for this, but Intel doesn’t support it!</a:t>
+            </a:r>
+          </a:p>
+          <a:p>
+            <a:r>
+              <a:rPr lang="en-GB" dirty="0"/>
+              <a:t>For MPI-enabled codes, running an MPI rank per socket would potentially be a much cleaner solution.</a:t>
+            </a:r>
           </a:p>
         </p:txBody>
       </p:sp>
@@ -850,9 +2234,10 @@
           <a:bodyPr/>
           <a:lstStyle/>
           <a:p>
-            <a:fld id="{18B7B4CC-BAF8-A446-A722-9B4FBD8C20C1}" type="slidenum">
+            <a:fld id="{9B3F2D69-97A9-4C41-91BD-6A22F8270148}" type="slidenum">
               <a:rPr lang="en-GB" smtClean="0"/>
-              <a:t>16</a:t>
+              <a:pPr/>
+              <a:t>15</a:t>
             </a:fld>
             <a:endParaRPr lang="en-GB"/>
           </a:p>
@@ -861,7 +2246,7 @@
     </p:spTree>
     <p:extLst>
       <p:ext uri="{BB962C8B-B14F-4D97-AF65-F5344CB8AC3E}">
-        <p14:creationId xmlns:p14="http://schemas.microsoft.com/office/powerpoint/2010/main" val="4260444199"/>
+        <p14:creationId xmlns:p14="http://schemas.microsoft.com/office/powerpoint/2010/main" val="88261932"/>
       </p:ext>
     </p:extLst>
   </p:cSld>
@@ -916,16 +2301,14 @@
           <a:lstStyle/>
           <a:p>
             <a:r>
-              <a:rPr lang="en-GB" dirty="0"/>
-              <a:t>This</a:t>
-            </a:r>
-            <a:r>
-              <a:rPr lang="en-GB" baseline="0" dirty="0"/>
-              <a:t> is now how NVIDIA recommend using pinned memory on their discrete GPUs (CL_MEM_ALLOC_HOST_PTR flag not required)</a:t>
-            </a:r>
-          </a:p>
-          <a:p>
-            <a:endParaRPr lang="en-GB" dirty="0"/>
+              <a:rPr lang="en-US" dirty="0"/>
+              <a:t>OpenCL</a:t>
+            </a:r>
+            <a:r>
+              <a:rPr lang="en-US" baseline="0" dirty="0"/>
+              <a:t> 2.0 shared virtual memory improves on this</a:t>
+            </a:r>
+            <a:endParaRPr lang="en-US" dirty="0"/>
           </a:p>
         </p:txBody>
       </p:sp>
@@ -944,10 +2327,9 @@
           <a:bodyPr/>
           <a:lstStyle/>
           <a:p>
-            <a:fld id="{9B3F2D69-97A9-4C41-91BD-6A22F8270148}" type="slidenum">
+            <a:fld id="{18B7B4CC-BAF8-A446-A722-9B4FBD8C20C1}" type="slidenum">
               <a:rPr lang="en-GB" smtClean="0"/>
-              <a:pPr/>
-              <a:t>17</a:t>
+              <a:t>16</a:t>
             </a:fld>
             <a:endParaRPr lang="en-GB"/>
           </a:p>
@@ -956,7 +2338,7 @@
     </p:spTree>
     <p:extLst>
       <p:ext uri="{BB962C8B-B14F-4D97-AF65-F5344CB8AC3E}">
-        <p14:creationId xmlns:p14="http://schemas.microsoft.com/office/powerpoint/2010/main" val="2737519926"/>
+        <p14:creationId xmlns:p14="http://schemas.microsoft.com/office/powerpoint/2010/main" val="4260444199"/>
       </p:ext>
     </p:extLst>
   </p:cSld>
@@ -1042,7 +2424,7 @@
             <a:fld id="{9B3F2D69-97A9-4C41-91BD-6A22F8270148}" type="slidenum">
               <a:rPr lang="en-GB" smtClean="0"/>
               <a:pPr/>
-              <a:t>18</a:t>
+              <a:t>17</a:t>
             </a:fld>
             <a:endParaRPr lang="en-GB"/>
           </a:p>
@@ -1051,7 +2433,7 @@
     </p:spTree>
     <p:extLst>
       <p:ext uri="{BB962C8B-B14F-4D97-AF65-F5344CB8AC3E}">
-        <p14:creationId xmlns:p14="http://schemas.microsoft.com/office/powerpoint/2010/main" val="63122233"/>
+        <p14:creationId xmlns:p14="http://schemas.microsoft.com/office/powerpoint/2010/main" val="2737519926"/>
       </p:ext>
     </p:extLst>
   </p:cSld>
@@ -1106,70 +2488,12 @@
           <a:lstStyle/>
           <a:p>
             <a:r>
-              <a:rPr lang="en-GB" dirty="0" err="1"/>
-              <a:t>Buffer+map</a:t>
-            </a:r>
-            <a:r>
               <a:rPr lang="en-GB" dirty="0"/>
-              <a:t> = malloc</a:t>
-            </a:r>
-          </a:p>
-          <a:p>
-            <a:r>
-              <a:rPr lang="en-GB" dirty="0"/>
-              <a:t>Just do read/write calls as normal</a:t>
-            </a:r>
-          </a:p>
-          <a:p>
-            <a:endParaRPr lang="en-GB" dirty="0"/>
-          </a:p>
-          <a:p>
-            <a:endParaRPr lang="en-GB" dirty="0"/>
-          </a:p>
-          <a:p>
-            <a:r>
-              <a:rPr lang="en-GB" dirty="0"/>
-              <a:t>This comes from NVIDIA’s (fairly old) OpenCL</a:t>
+              <a:t>This</a:t>
             </a:r>
             <a:r>
               <a:rPr lang="en-GB" baseline="0" dirty="0"/>
-              <a:t> optimisation guidelines.</a:t>
-            </a:r>
-          </a:p>
-          <a:p>
-            <a:r>
-              <a:rPr lang="en-GB" baseline="0" dirty="0"/>
-              <a:t>NVIDIA now recommend a new approach with latest drivers, using regular map/</a:t>
-            </a:r>
-            <a:r>
-              <a:rPr lang="en-GB" baseline="0" dirty="0" err="1"/>
-              <a:t>unmap</a:t>
-            </a:r>
-            <a:r>
-              <a:rPr lang="en-GB" baseline="0" dirty="0"/>
-              <a:t> approach (mentioned later on zero-copy slide).</a:t>
-            </a:r>
-          </a:p>
-          <a:p>
-            <a:r>
-              <a:rPr lang="en-GB" dirty="0"/>
-              <a:t>http://on-</a:t>
-            </a:r>
-            <a:r>
-              <a:rPr lang="en-GB" dirty="0" err="1"/>
-              <a:t>demand.gputechconf.com</a:t>
-            </a:r>
-            <a:r>
-              <a:rPr lang="en-GB" dirty="0"/>
-              <a:t>/</a:t>
-            </a:r>
-            <a:r>
-              <a:rPr lang="en-GB" dirty="0" err="1"/>
-              <a:t>gtc</a:t>
-            </a:r>
-            <a:r>
-              <a:rPr lang="en-GB" dirty="0"/>
-              <a:t>/2016/presentation/s6382-karthik-ravi-Perf-considerations-for-OpenCL.pdf</a:t>
+              <a:t> is now how NVIDIA recommend using pinned memory on their discrete GPUs (CL_MEM_ALLOC_HOST_PTR flag not required)</a:t>
             </a:r>
           </a:p>
           <a:p>
@@ -1195,7 +2519,7 @@
             <a:fld id="{9B3F2D69-97A9-4C41-91BD-6A22F8270148}" type="slidenum">
               <a:rPr lang="en-GB" smtClean="0"/>
               <a:pPr/>
-              <a:t>32</a:t>
+              <a:t>18</a:t>
             </a:fld>
             <a:endParaRPr lang="en-GB"/>
           </a:p>
@@ -1204,7 +2528,7 @@
     </p:spTree>
     <p:extLst>
       <p:ext uri="{BB962C8B-B14F-4D97-AF65-F5344CB8AC3E}">
-        <p14:creationId xmlns:p14="http://schemas.microsoft.com/office/powerpoint/2010/main" val="2737519926"/>
+        <p14:creationId xmlns:p14="http://schemas.microsoft.com/office/powerpoint/2010/main" val="63122233"/>
       </p:ext>
     </p:extLst>
   </p:cSld>
@@ -1348,7 +2672,7 @@
             <a:fld id="{9B3F2D69-97A9-4C41-91BD-6A22F8270148}" type="slidenum">
               <a:rPr lang="en-GB" smtClean="0"/>
               <a:pPr/>
-              <a:t>33</a:t>
+              <a:t>32</a:t>
             </a:fld>
             <a:endParaRPr lang="en-GB"/>
           </a:p>
@@ -1357,7 +2681,7 @@
     </p:spTree>
     <p:extLst>
       <p:ext uri="{BB962C8B-B14F-4D97-AF65-F5344CB8AC3E}">
-        <p14:creationId xmlns:p14="http://schemas.microsoft.com/office/powerpoint/2010/main" val="1798866693"/>
+        <p14:creationId xmlns:p14="http://schemas.microsoft.com/office/powerpoint/2010/main" val="2737519926"/>
       </p:ext>
     </p:extLst>
   </p:cSld>
@@ -1411,6 +2735,74 @@
           <a:bodyPr/>
           <a:lstStyle/>
           <a:p>
+            <a:r>
+              <a:rPr lang="en-GB" dirty="0" err="1"/>
+              <a:t>Buffer+map</a:t>
+            </a:r>
+            <a:r>
+              <a:rPr lang="en-GB" dirty="0"/>
+              <a:t> = malloc</a:t>
+            </a:r>
+          </a:p>
+          <a:p>
+            <a:r>
+              <a:rPr lang="en-GB" dirty="0"/>
+              <a:t>Just do read/write calls as normal</a:t>
+            </a:r>
+          </a:p>
+          <a:p>
+            <a:endParaRPr lang="en-GB" dirty="0"/>
+          </a:p>
+          <a:p>
+            <a:endParaRPr lang="en-GB" dirty="0"/>
+          </a:p>
+          <a:p>
+            <a:r>
+              <a:rPr lang="en-GB" dirty="0"/>
+              <a:t>This comes from NVIDIA’s (fairly old) OpenCL</a:t>
+            </a:r>
+            <a:r>
+              <a:rPr lang="en-GB" baseline="0" dirty="0"/>
+              <a:t> optimisation guidelines.</a:t>
+            </a:r>
+          </a:p>
+          <a:p>
+            <a:r>
+              <a:rPr lang="en-GB" baseline="0" dirty="0"/>
+              <a:t>NVIDIA now recommend a new approach with latest drivers, using regular map/</a:t>
+            </a:r>
+            <a:r>
+              <a:rPr lang="en-GB" baseline="0" dirty="0" err="1"/>
+              <a:t>unmap</a:t>
+            </a:r>
+            <a:r>
+              <a:rPr lang="en-GB" baseline="0" dirty="0"/>
+              <a:t> approach (mentioned later on zero-copy slide).</a:t>
+            </a:r>
+          </a:p>
+          <a:p>
+            <a:r>
+              <a:rPr lang="en-GB" dirty="0"/>
+              <a:t>http://on-</a:t>
+            </a:r>
+            <a:r>
+              <a:rPr lang="en-GB" dirty="0" err="1"/>
+              <a:t>demand.gputechconf.com</a:t>
+            </a:r>
+            <a:r>
+              <a:rPr lang="en-GB" dirty="0"/>
+              <a:t>/</a:t>
+            </a:r>
+            <a:r>
+              <a:rPr lang="en-GB" dirty="0" err="1"/>
+              <a:t>gtc</a:t>
+            </a:r>
+            <a:r>
+              <a:rPr lang="en-GB" dirty="0"/>
+              <a:t>/2016/presentation/s6382-karthik-ravi-Perf-considerations-for-OpenCL.pdf</a:t>
+            </a:r>
+          </a:p>
+          <a:p>
             <a:endParaRPr lang="en-GB" dirty="0"/>
           </a:p>
         </p:txBody>
@@ -1430,9 +2822,10 @@
           <a:bodyPr/>
           <a:lstStyle/>
           <a:p>
-            <a:fld id="{18B7B4CC-BAF8-A446-A722-9B4FBD8C20C1}" type="slidenum">
+            <a:fld id="{9B3F2D69-97A9-4C41-91BD-6A22F8270148}" type="slidenum">
               <a:rPr lang="en-GB" smtClean="0"/>
-              <a:t>34</a:t>
+              <a:pPr/>
+              <a:t>33</a:t>
             </a:fld>
             <a:endParaRPr lang="en-GB"/>
           </a:p>
@@ -1441,7 +2834,7 @@
     </p:spTree>
     <p:extLst>
       <p:ext uri="{BB962C8B-B14F-4D97-AF65-F5344CB8AC3E}">
-        <p14:creationId xmlns:p14="http://schemas.microsoft.com/office/powerpoint/2010/main" val="1721967820"/>
+        <p14:creationId xmlns:p14="http://schemas.microsoft.com/office/powerpoint/2010/main" val="1798866693"/>
       </p:ext>
     </p:extLst>
   </p:cSld>
@@ -1630,7 +3023,7 @@
           <a:p>
             <a:fld id="{434BF399-455A-2040-B761-8E372A559CC8}" type="datetime1">
               <a:rPr lang="en-GB" smtClean="0"/>
-              <a:t>09/05/2019</a:t>
+              <a:t>12/05/2019</a:t>
             </a:fld>
             <a:endParaRPr lang="en-GB"/>
           </a:p>
@@ -1798,7 +3191,7 @@
           <a:p>
             <a:fld id="{66D7E041-F961-EF45-9B85-40471AD578AB}" type="datetime1">
               <a:rPr lang="en-GB" smtClean="0"/>
-              <a:t>09/05/2019</a:t>
+              <a:t>12/05/2019</a:t>
             </a:fld>
             <a:endParaRPr lang="en-GB"/>
           </a:p>
@@ -1976,7 +3369,7 @@
           <a:p>
             <a:fld id="{0854023F-9FC6-1249-81DD-423DC9D44E62}" type="datetime1">
               <a:rPr lang="en-GB" smtClean="0"/>
-              <a:t>09/05/2019</a:t>
+              <a:t>12/05/2019</a:t>
             </a:fld>
             <a:endParaRPr lang="en-GB"/>
           </a:p>
@@ -2144,7 +3537,7 @@
           <a:p>
             <a:fld id="{D7C824EA-2FA3-AB4A-8855-C9188968495F}" type="datetime1">
               <a:rPr lang="en-GB" smtClean="0"/>
-              <a:t>09/05/2019</a:t>
+              <a:t>12/05/2019</a:t>
             </a:fld>
             <a:endParaRPr lang="en-GB"/>
           </a:p>
@@ -2389,7 +3782,7 @@
           <a:p>
             <a:fld id="{0BA40996-194E-5F43-9DA2-BA952E3DBB1B}" type="datetime1">
               <a:rPr lang="en-GB" smtClean="0"/>
-              <a:t>09/05/2019</a:t>
+              <a:t>12/05/2019</a:t>
             </a:fld>
             <a:endParaRPr lang="en-GB"/>
           </a:p>
@@ -2674,7 +4067,7 @@
           <a:p>
             <a:fld id="{B77B3EA8-ABFF-B240-ABAF-2266E5E197FB}" type="datetime1">
               <a:rPr lang="en-GB" smtClean="0"/>
-              <a:t>09/05/2019</a:t>
+              <a:t>12/05/2019</a:t>
             </a:fld>
             <a:endParaRPr lang="en-GB"/>
           </a:p>
@@ -3093,7 +4486,7 @@
           <a:p>
             <a:fld id="{53D973E6-75D3-094A-B521-2A1B6CC6ADD8}" type="datetime1">
               <a:rPr lang="en-GB" smtClean="0"/>
-              <a:t>09/05/2019</a:t>
+              <a:t>12/05/2019</a:t>
             </a:fld>
             <a:endParaRPr lang="en-GB"/>
           </a:p>
@@ -3210,7 +4603,7 @@
           <a:p>
             <a:fld id="{AD756494-DA0B-0B4C-822F-A17F31E0F766}" type="datetime1">
               <a:rPr lang="en-GB" smtClean="0"/>
-              <a:t>09/05/2019</a:t>
+              <a:t>12/05/2019</a:t>
             </a:fld>
             <a:endParaRPr lang="en-GB"/>
           </a:p>
@@ -3305,7 +4698,7 @@
           <a:p>
             <a:fld id="{2D910873-4386-2045-AD38-CE6042B1A6DD}" type="datetime1">
               <a:rPr lang="en-GB" smtClean="0"/>
-              <a:t>09/05/2019</a:t>
+              <a:t>12/05/2019</a:t>
             </a:fld>
             <a:endParaRPr lang="en-GB"/>
           </a:p>
@@ -3580,7 +4973,7 @@
           <a:p>
             <a:fld id="{420BD8C8-777F-FF4F-AE5B-803CBD416198}" type="datetime1">
               <a:rPr lang="en-GB" smtClean="0"/>
-              <a:t>09/05/2019</a:t>
+              <a:t>12/05/2019</a:t>
             </a:fld>
             <a:endParaRPr lang="en-GB"/>
           </a:p>
@@ -3832,7 +5225,7 @@
           <a:p>
             <a:fld id="{5C3510D0-C909-CF48-BCF7-D4777158B515}" type="datetime1">
               <a:rPr lang="en-GB" smtClean="0"/>
-              <a:t>09/05/2019</a:t>
+              <a:t>12/05/2019</a:t>
             </a:fld>
             <a:endParaRPr lang="en-GB"/>
           </a:p>
@@ -4043,7 +5436,7 @@
           <a:p>
             <a:fld id="{88407691-4358-6E4E-85CA-D5368AF438E7}" type="datetime1">
               <a:rPr lang="en-GB" smtClean="0"/>
-              <a:t>09/05/2019</a:t>
+              <a:t>12/05/2019</a:t>
             </a:fld>
             <a:endParaRPr lang="en-GB"/>
           </a:p>
@@ -5426,7 +6819,7 @@
           <a:p>
             <a:r>
               <a:rPr lang="en-US" dirty="0"/>
-              <a:t>OpenCL provides the concept of sub-devices which can be used to address this</a:t>
+              <a:t>OpenCL provides the concept of sub-devices which can be used to address this issue</a:t>
             </a:r>
           </a:p>
           <a:p>
@@ -8033,6 +9426,63 @@
       </p:grpSpPr>
       <p:sp>
         <p:nvSpPr>
+          <p:cNvPr id="3" name="Rectangle 2">
+            <a:extLst>
+              <a:ext uri="{FF2B5EF4-FFF2-40B4-BE49-F238E27FC236}">
+                <a16:creationId xmlns:a16="http://schemas.microsoft.com/office/drawing/2014/main" id="{7536E0A2-73C2-5740-8A60-D5C1D6558E07}"/>
+              </a:ext>
+            </a:extLst>
+          </p:cNvPr>
+          <p:cNvSpPr/>
+          <p:nvPr/>
+        </p:nvSpPr>
+        <p:spPr>
+          <a:xfrm>
+            <a:off x="4032250" y="4747846"/>
+            <a:ext cx="4644206" cy="1477108"/>
+          </a:xfrm>
+          <a:prstGeom prst="rect">
+            <a:avLst/>
+          </a:prstGeom>
+          <a:solidFill>
+            <a:schemeClr val="bg1">
+              <a:lumMod val="75000"/>
+            </a:schemeClr>
+          </a:solidFill>
+          <a:ln>
+            <a:solidFill>
+              <a:schemeClr val="bg1">
+                <a:lumMod val="50000"/>
+              </a:schemeClr>
+            </a:solidFill>
+          </a:ln>
+          <a:effectLst/>
+        </p:spPr>
+        <p:style>
+          <a:lnRef idx="1">
+            <a:schemeClr val="accent1"/>
+          </a:lnRef>
+          <a:fillRef idx="3">
+            <a:schemeClr val="accent1"/>
+          </a:fillRef>
+          <a:effectRef idx="2">
+            <a:schemeClr val="accent1"/>
+          </a:effectRef>
+          <a:fontRef idx="minor">
+            <a:schemeClr val="lt1"/>
+          </a:fontRef>
+        </p:style>
+        <p:txBody>
+          <a:bodyPr rtlCol="0" anchor="ctr"/>
+          <a:lstStyle/>
+          <a:p>
+            <a:pPr algn="ctr"/>
+            <a:endParaRPr lang="en-US"/>
+          </a:p>
+        </p:txBody>
+      </p:sp>
+      <p:sp>
+        <p:nvSpPr>
           <p:cNvPr id="2" name="Title 1"/>
           <p:cNvSpPr>
             <a:spLocks noGrp="1"/>
@@ -8133,7 +9583,19 @@
             </a:pPr>
             <a:r>
               <a:rPr lang="en-US" dirty="0"/>
-              <a:t>When we want to access the memory from the host, we map the buffer</a:t>
+              <a:t>When we want to access the memory from the host, we </a:t>
+            </a:r>
+            <a:r>
+              <a:rPr lang="en-US" b="1" i="1" dirty="0">
+                <a:solidFill>
+                  <a:srgbClr val="00B050"/>
+                </a:solidFill>
+              </a:rPr>
+              <a:t>map</a:t>
+            </a:r>
+            <a:r>
+              <a:rPr lang="en-US" dirty="0"/>
+              <a:t> the buffer</a:t>
             </a:r>
           </a:p>
           <a:p>
@@ -8154,7 +9616,19 @@
             </a:r>
             <a:r>
               <a:rPr lang="en-US" dirty="0"/>
-              <a:t> be unmapped before we can use it on the device again</a:t>
+              <a:t> be </a:t>
+            </a:r>
+            <a:r>
+              <a:rPr lang="en-US" b="1" i="1" dirty="0">
+                <a:solidFill>
+                  <a:srgbClr val="00B050"/>
+                </a:solidFill>
+              </a:rPr>
+              <a:t>unmapped</a:t>
+            </a:r>
+            <a:r>
+              <a:rPr lang="en-US" dirty="0"/>
+              <a:t> before we can use it on the device again</a:t>
             </a:r>
           </a:p>
           <a:p>
@@ -8180,7 +9654,19 @@
             </a:pPr>
             <a:r>
               <a:rPr lang="en-US" dirty="0"/>
-              <a:t>NVIDIA now recommend this approach as Map uses pinned memory internally</a:t>
+              <a:t>NVIDIA now recommend this approach as </a:t>
+            </a:r>
+            <a:r>
+              <a:rPr lang="en-US" b="1" dirty="0">
+                <a:solidFill>
+                  <a:srgbClr val="00B050"/>
+                </a:solidFill>
+              </a:rPr>
+              <a:t>map</a:t>
+            </a:r>
+            <a:r>
+              <a:rPr lang="en-US" dirty="0"/>
+              <a:t> uses pinned memory internally</a:t>
             </a:r>
           </a:p>
           <a:p>
@@ -8792,7 +10278,17 @@
                 <a:latin typeface="Courier New"/>
                 <a:cs typeface="Courier New"/>
               </a:rPr>
-              <a:t>// use buffer on the host</a:t>
+              <a:t>// </a:t>
+            </a:r>
+            <a:r>
+              <a:rPr lang="en-US" sz="1400" b="1" i="1" u="sng" dirty="0">
+                <a:solidFill>
+                  <a:srgbClr val="008000"/>
+                </a:solidFill>
+                <a:latin typeface="Courier New"/>
+                <a:cs typeface="Courier New"/>
+              </a:rPr>
+              <a:t>use buffer on the host</a:t>
             </a:r>
           </a:p>
           <a:p>
@@ -9061,7 +10557,17 @@
                 <a:latin typeface="Courier New"/>
                 <a:cs typeface="Courier New"/>
               </a:rPr>
-              <a:t>// use buffer on device</a:t>
+              <a:t>// </a:t>
+            </a:r>
+            <a:r>
+              <a:rPr lang="en-US" sz="1400" b="1" i="1" u="sng" dirty="0">
+                <a:solidFill>
+                  <a:srgbClr val="008000"/>
+                </a:solidFill>
+                <a:latin typeface="Courier New"/>
+                <a:cs typeface="Courier New"/>
+              </a:rPr>
+              <a:t>use buffer on device</a:t>
             </a:r>
           </a:p>
         </p:txBody>
@@ -9109,8 +10615,8 @@
         </p:nvSpPr>
         <p:spPr>
           <a:xfrm>
-            <a:off x="134771" y="6397161"/>
-            <a:ext cx="5076056" cy="461665"/>
+            <a:off x="791259" y="6629850"/>
+            <a:ext cx="7520400" cy="276999"/>
           </a:xfrm>
           <a:prstGeom prst="rect">
             <a:avLst/>
@@ -9201,6 +10707,1129 @@
   <p:clrMapOvr>
     <a:masterClrMapping/>
   </p:clrMapOvr>
+  <p:timing>
+    <p:tnLst>
+      <p:par>
+        <p:cTn id="1" dur="indefinite" restart="never" nodeType="tmRoot">
+          <p:childTnLst>
+            <p:seq concurrent="1" nextAc="seek">
+              <p:cTn id="2" dur="indefinite" nodeType="mainSeq">
+                <p:childTnLst>
+                  <p:par>
+                    <p:cTn id="3" fill="hold">
+                      <p:stCondLst>
+                        <p:cond delay="indefinite"/>
+                      </p:stCondLst>
+                      <p:childTnLst>
+                        <p:par>
+                          <p:cTn id="4" fill="hold">
+                            <p:stCondLst>
+                              <p:cond delay="0"/>
+                            </p:stCondLst>
+                            <p:childTnLst>
+                              <p:par>
+                                <p:cTn id="5" presetID="22" presetClass="entr" presetSubtype="1" fill="hold" grpId="0" nodeType="clickEffect">
+                                  <p:stCondLst>
+                                    <p:cond delay="0"/>
+                                  </p:stCondLst>
+                                  <p:childTnLst>
+                                    <p:set>
+                                      <p:cBhvr>
+                                        <p:cTn id="6" dur="1" fill="hold">
+                                          <p:stCondLst>
+                                            <p:cond delay="0"/>
+                                          </p:stCondLst>
+                                        </p:cTn>
+                                        <p:tgtEl>
+                                          <p:spTgt spid="6">
+                                            <p:txEl>
+                                              <p:pRg st="0" end="0"/>
+                                            </p:txEl>
+                                          </p:spTgt>
+                                        </p:tgtEl>
+                                        <p:attrNameLst>
+                                          <p:attrName>style.visibility</p:attrName>
+                                        </p:attrNameLst>
+                                      </p:cBhvr>
+                                      <p:to>
+                                        <p:strVal val="visible"/>
+                                      </p:to>
+                                    </p:set>
+                                    <p:animEffect transition="in" filter="wipe(up)">
+                                      <p:cBhvr>
+                                        <p:cTn id="7" dur="500"/>
+                                        <p:tgtEl>
+                                          <p:spTgt spid="6">
+                                            <p:txEl>
+                                              <p:pRg st="0" end="0"/>
+                                            </p:txEl>
+                                          </p:spTgt>
+                                        </p:tgtEl>
+                                      </p:cBhvr>
+                                    </p:animEffect>
+                                  </p:childTnLst>
+                                </p:cTn>
+                              </p:par>
+                              <p:par>
+                                <p:cTn id="8" presetID="22" presetClass="entr" presetSubtype="1" fill="hold" grpId="0" nodeType="withEffect">
+                                  <p:stCondLst>
+                                    <p:cond delay="0"/>
+                                  </p:stCondLst>
+                                  <p:childTnLst>
+                                    <p:set>
+                                      <p:cBhvr>
+                                        <p:cTn id="9" dur="1" fill="hold">
+                                          <p:stCondLst>
+                                            <p:cond delay="0"/>
+                                          </p:stCondLst>
+                                        </p:cTn>
+                                        <p:tgtEl>
+                                          <p:spTgt spid="6">
+                                            <p:txEl>
+                                              <p:pRg st="1" end="1"/>
+                                            </p:txEl>
+                                          </p:spTgt>
+                                        </p:tgtEl>
+                                        <p:attrNameLst>
+                                          <p:attrName>style.visibility</p:attrName>
+                                        </p:attrNameLst>
+                                      </p:cBhvr>
+                                      <p:to>
+                                        <p:strVal val="visible"/>
+                                      </p:to>
+                                    </p:set>
+                                    <p:animEffect transition="in" filter="wipe(up)">
+                                      <p:cBhvr>
+                                        <p:cTn id="10" dur="500"/>
+                                        <p:tgtEl>
+                                          <p:spTgt spid="6">
+                                            <p:txEl>
+                                              <p:pRg st="1" end="1"/>
+                                            </p:txEl>
+                                          </p:spTgt>
+                                        </p:tgtEl>
+                                      </p:cBhvr>
+                                    </p:animEffect>
+                                  </p:childTnLst>
+                                </p:cTn>
+                              </p:par>
+                              <p:par>
+                                <p:cTn id="11" presetID="22" presetClass="entr" presetSubtype="1" fill="hold" grpId="0" nodeType="withEffect">
+                                  <p:stCondLst>
+                                    <p:cond delay="0"/>
+                                  </p:stCondLst>
+                                  <p:childTnLst>
+                                    <p:set>
+                                      <p:cBhvr>
+                                        <p:cTn id="12" dur="1" fill="hold">
+                                          <p:stCondLst>
+                                            <p:cond delay="0"/>
+                                          </p:stCondLst>
+                                        </p:cTn>
+                                        <p:tgtEl>
+                                          <p:spTgt spid="6">
+                                            <p:txEl>
+                                              <p:pRg st="2" end="2"/>
+                                            </p:txEl>
+                                          </p:spTgt>
+                                        </p:tgtEl>
+                                        <p:attrNameLst>
+                                          <p:attrName>style.visibility</p:attrName>
+                                        </p:attrNameLst>
+                                      </p:cBhvr>
+                                      <p:to>
+                                        <p:strVal val="visible"/>
+                                      </p:to>
+                                    </p:set>
+                                    <p:animEffect transition="in" filter="wipe(up)">
+                                      <p:cBhvr>
+                                        <p:cTn id="13" dur="500"/>
+                                        <p:tgtEl>
+                                          <p:spTgt spid="6">
+                                            <p:txEl>
+                                              <p:pRg st="2" end="2"/>
+                                            </p:txEl>
+                                          </p:spTgt>
+                                        </p:tgtEl>
+                                      </p:cBhvr>
+                                    </p:animEffect>
+                                  </p:childTnLst>
+                                </p:cTn>
+                              </p:par>
+                              <p:par>
+                                <p:cTn id="14" presetID="22" presetClass="entr" presetSubtype="1" fill="hold" grpId="0" nodeType="withEffect">
+                                  <p:stCondLst>
+                                    <p:cond delay="0"/>
+                                  </p:stCondLst>
+                                  <p:childTnLst>
+                                    <p:set>
+                                      <p:cBhvr>
+                                        <p:cTn id="15" dur="1" fill="hold">
+                                          <p:stCondLst>
+                                            <p:cond delay="0"/>
+                                          </p:stCondLst>
+                                        </p:cTn>
+                                        <p:tgtEl>
+                                          <p:spTgt spid="6">
+                                            <p:txEl>
+                                              <p:pRg st="3" end="3"/>
+                                            </p:txEl>
+                                          </p:spTgt>
+                                        </p:tgtEl>
+                                        <p:attrNameLst>
+                                          <p:attrName>style.visibility</p:attrName>
+                                        </p:attrNameLst>
+                                      </p:cBhvr>
+                                      <p:to>
+                                        <p:strVal val="visible"/>
+                                      </p:to>
+                                    </p:set>
+                                    <p:animEffect transition="in" filter="wipe(up)">
+                                      <p:cBhvr>
+                                        <p:cTn id="16" dur="500"/>
+                                        <p:tgtEl>
+                                          <p:spTgt spid="6">
+                                            <p:txEl>
+                                              <p:pRg st="3" end="3"/>
+                                            </p:txEl>
+                                          </p:spTgt>
+                                        </p:tgtEl>
+                                      </p:cBhvr>
+                                    </p:animEffect>
+                                  </p:childTnLst>
+                                </p:cTn>
+                              </p:par>
+                              <p:par>
+                                <p:cTn id="17" presetID="22" presetClass="entr" presetSubtype="1" fill="hold" grpId="0" nodeType="withEffect">
+                                  <p:stCondLst>
+                                    <p:cond delay="0"/>
+                                  </p:stCondLst>
+                                  <p:childTnLst>
+                                    <p:set>
+                                      <p:cBhvr>
+                                        <p:cTn id="18" dur="1" fill="hold">
+                                          <p:stCondLst>
+                                            <p:cond delay="0"/>
+                                          </p:stCondLst>
+                                        </p:cTn>
+                                        <p:tgtEl>
+                                          <p:spTgt spid="6">
+                                            <p:txEl>
+                                              <p:pRg st="4" end="4"/>
+                                            </p:txEl>
+                                          </p:spTgt>
+                                        </p:tgtEl>
+                                        <p:attrNameLst>
+                                          <p:attrName>style.visibility</p:attrName>
+                                        </p:attrNameLst>
+                                      </p:cBhvr>
+                                      <p:to>
+                                        <p:strVal val="visible"/>
+                                      </p:to>
+                                    </p:set>
+                                    <p:animEffect transition="in" filter="wipe(up)">
+                                      <p:cBhvr>
+                                        <p:cTn id="19" dur="500"/>
+                                        <p:tgtEl>
+                                          <p:spTgt spid="6">
+                                            <p:txEl>
+                                              <p:pRg st="4" end="4"/>
+                                            </p:txEl>
+                                          </p:spTgt>
+                                        </p:tgtEl>
+                                      </p:cBhvr>
+                                    </p:animEffect>
+                                  </p:childTnLst>
+                                </p:cTn>
+                              </p:par>
+                            </p:childTnLst>
+                          </p:cTn>
+                        </p:par>
+                      </p:childTnLst>
+                    </p:cTn>
+                  </p:par>
+                  <p:par>
+                    <p:cTn id="20" fill="hold">
+                      <p:stCondLst>
+                        <p:cond delay="indefinite"/>
+                      </p:stCondLst>
+                      <p:childTnLst>
+                        <p:par>
+                          <p:cTn id="21" fill="hold">
+                            <p:stCondLst>
+                              <p:cond delay="0"/>
+                            </p:stCondLst>
+                            <p:childTnLst>
+                              <p:par>
+                                <p:cTn id="22" presetID="22" presetClass="entr" presetSubtype="1" fill="hold" grpId="0" nodeType="clickEffect">
+                                  <p:stCondLst>
+                                    <p:cond delay="0"/>
+                                  </p:stCondLst>
+                                  <p:childTnLst>
+                                    <p:set>
+                                      <p:cBhvr>
+                                        <p:cTn id="23" dur="1" fill="hold">
+                                          <p:stCondLst>
+                                            <p:cond delay="0"/>
+                                          </p:stCondLst>
+                                        </p:cTn>
+                                        <p:tgtEl>
+                                          <p:spTgt spid="6">
+                                            <p:txEl>
+                                              <p:pRg st="6" end="6"/>
+                                            </p:txEl>
+                                          </p:spTgt>
+                                        </p:tgtEl>
+                                        <p:attrNameLst>
+                                          <p:attrName>style.visibility</p:attrName>
+                                        </p:attrNameLst>
+                                      </p:cBhvr>
+                                      <p:to>
+                                        <p:strVal val="visible"/>
+                                      </p:to>
+                                    </p:set>
+                                    <p:animEffect transition="in" filter="wipe(up)">
+                                      <p:cBhvr>
+                                        <p:cTn id="24" dur="500"/>
+                                        <p:tgtEl>
+                                          <p:spTgt spid="6">
+                                            <p:txEl>
+                                              <p:pRg st="6" end="6"/>
+                                            </p:txEl>
+                                          </p:spTgt>
+                                        </p:tgtEl>
+                                      </p:cBhvr>
+                                    </p:animEffect>
+                                  </p:childTnLst>
+                                </p:cTn>
+                              </p:par>
+                              <p:par>
+                                <p:cTn id="25" presetID="22" presetClass="entr" presetSubtype="1" fill="hold" grpId="0" nodeType="withEffect">
+                                  <p:stCondLst>
+                                    <p:cond delay="0"/>
+                                  </p:stCondLst>
+                                  <p:childTnLst>
+                                    <p:set>
+                                      <p:cBhvr>
+                                        <p:cTn id="26" dur="1" fill="hold">
+                                          <p:stCondLst>
+                                            <p:cond delay="0"/>
+                                          </p:stCondLst>
+                                        </p:cTn>
+                                        <p:tgtEl>
+                                          <p:spTgt spid="6">
+                                            <p:txEl>
+                                              <p:pRg st="7" end="7"/>
+                                            </p:txEl>
+                                          </p:spTgt>
+                                        </p:tgtEl>
+                                        <p:attrNameLst>
+                                          <p:attrName>style.visibility</p:attrName>
+                                        </p:attrNameLst>
+                                      </p:cBhvr>
+                                      <p:to>
+                                        <p:strVal val="visible"/>
+                                      </p:to>
+                                    </p:set>
+                                    <p:animEffect transition="in" filter="wipe(up)">
+                                      <p:cBhvr>
+                                        <p:cTn id="27" dur="500"/>
+                                        <p:tgtEl>
+                                          <p:spTgt spid="6">
+                                            <p:txEl>
+                                              <p:pRg st="7" end="7"/>
+                                            </p:txEl>
+                                          </p:spTgt>
+                                        </p:tgtEl>
+                                      </p:cBhvr>
+                                    </p:animEffect>
+                                  </p:childTnLst>
+                                </p:cTn>
+                              </p:par>
+                              <p:par>
+                                <p:cTn id="28" presetID="22" presetClass="entr" presetSubtype="1" fill="hold" grpId="0" nodeType="withEffect">
+                                  <p:stCondLst>
+                                    <p:cond delay="0"/>
+                                  </p:stCondLst>
+                                  <p:childTnLst>
+                                    <p:set>
+                                      <p:cBhvr>
+                                        <p:cTn id="29" dur="1" fill="hold">
+                                          <p:stCondLst>
+                                            <p:cond delay="0"/>
+                                          </p:stCondLst>
+                                        </p:cTn>
+                                        <p:tgtEl>
+                                          <p:spTgt spid="6">
+                                            <p:txEl>
+                                              <p:pRg st="8" end="8"/>
+                                            </p:txEl>
+                                          </p:spTgt>
+                                        </p:tgtEl>
+                                        <p:attrNameLst>
+                                          <p:attrName>style.visibility</p:attrName>
+                                        </p:attrNameLst>
+                                      </p:cBhvr>
+                                      <p:to>
+                                        <p:strVal val="visible"/>
+                                      </p:to>
+                                    </p:set>
+                                    <p:animEffect transition="in" filter="wipe(up)">
+                                      <p:cBhvr>
+                                        <p:cTn id="30" dur="500"/>
+                                        <p:tgtEl>
+                                          <p:spTgt spid="6">
+                                            <p:txEl>
+                                              <p:pRg st="8" end="8"/>
+                                            </p:txEl>
+                                          </p:spTgt>
+                                        </p:tgtEl>
+                                      </p:cBhvr>
+                                    </p:animEffect>
+                                  </p:childTnLst>
+                                </p:cTn>
+                              </p:par>
+                              <p:par>
+                                <p:cTn id="31" presetID="22" presetClass="entr" presetSubtype="1" fill="hold" grpId="0" nodeType="withEffect">
+                                  <p:stCondLst>
+                                    <p:cond delay="0"/>
+                                  </p:stCondLst>
+                                  <p:childTnLst>
+                                    <p:set>
+                                      <p:cBhvr>
+                                        <p:cTn id="32" dur="1" fill="hold">
+                                          <p:stCondLst>
+                                            <p:cond delay="0"/>
+                                          </p:stCondLst>
+                                        </p:cTn>
+                                        <p:tgtEl>
+                                          <p:spTgt spid="6">
+                                            <p:txEl>
+                                              <p:pRg st="9" end="9"/>
+                                            </p:txEl>
+                                          </p:spTgt>
+                                        </p:tgtEl>
+                                        <p:attrNameLst>
+                                          <p:attrName>style.visibility</p:attrName>
+                                        </p:attrNameLst>
+                                      </p:cBhvr>
+                                      <p:to>
+                                        <p:strVal val="visible"/>
+                                      </p:to>
+                                    </p:set>
+                                    <p:animEffect transition="in" filter="wipe(up)">
+                                      <p:cBhvr>
+                                        <p:cTn id="33" dur="500"/>
+                                        <p:tgtEl>
+                                          <p:spTgt spid="6">
+                                            <p:txEl>
+                                              <p:pRg st="9" end="9"/>
+                                            </p:txEl>
+                                          </p:spTgt>
+                                        </p:tgtEl>
+                                      </p:cBhvr>
+                                    </p:animEffect>
+                                  </p:childTnLst>
+                                </p:cTn>
+                              </p:par>
+                              <p:par>
+                                <p:cTn id="34" presetID="22" presetClass="entr" presetSubtype="1" fill="hold" grpId="0" nodeType="withEffect">
+                                  <p:stCondLst>
+                                    <p:cond delay="0"/>
+                                  </p:stCondLst>
+                                  <p:childTnLst>
+                                    <p:set>
+                                      <p:cBhvr>
+                                        <p:cTn id="35" dur="1" fill="hold">
+                                          <p:stCondLst>
+                                            <p:cond delay="0"/>
+                                          </p:stCondLst>
+                                        </p:cTn>
+                                        <p:tgtEl>
+                                          <p:spTgt spid="6">
+                                            <p:txEl>
+                                              <p:pRg st="10" end="10"/>
+                                            </p:txEl>
+                                          </p:spTgt>
+                                        </p:tgtEl>
+                                        <p:attrNameLst>
+                                          <p:attrName>style.visibility</p:attrName>
+                                        </p:attrNameLst>
+                                      </p:cBhvr>
+                                      <p:to>
+                                        <p:strVal val="visible"/>
+                                      </p:to>
+                                    </p:set>
+                                    <p:animEffect transition="in" filter="wipe(up)">
+                                      <p:cBhvr>
+                                        <p:cTn id="36" dur="500"/>
+                                        <p:tgtEl>
+                                          <p:spTgt spid="6">
+                                            <p:txEl>
+                                              <p:pRg st="10" end="10"/>
+                                            </p:txEl>
+                                          </p:spTgt>
+                                        </p:tgtEl>
+                                      </p:cBhvr>
+                                    </p:animEffect>
+                                  </p:childTnLst>
+                                </p:cTn>
+                              </p:par>
+                              <p:par>
+                                <p:cTn id="37" presetID="22" presetClass="entr" presetSubtype="1" fill="hold" grpId="0" nodeType="withEffect">
+                                  <p:stCondLst>
+                                    <p:cond delay="0"/>
+                                  </p:stCondLst>
+                                  <p:childTnLst>
+                                    <p:set>
+                                      <p:cBhvr>
+                                        <p:cTn id="38" dur="1" fill="hold">
+                                          <p:stCondLst>
+                                            <p:cond delay="0"/>
+                                          </p:stCondLst>
+                                        </p:cTn>
+                                        <p:tgtEl>
+                                          <p:spTgt spid="6">
+                                            <p:txEl>
+                                              <p:pRg st="11" end="11"/>
+                                            </p:txEl>
+                                          </p:spTgt>
+                                        </p:tgtEl>
+                                        <p:attrNameLst>
+                                          <p:attrName>style.visibility</p:attrName>
+                                        </p:attrNameLst>
+                                      </p:cBhvr>
+                                      <p:to>
+                                        <p:strVal val="visible"/>
+                                      </p:to>
+                                    </p:set>
+                                    <p:animEffect transition="in" filter="wipe(up)">
+                                      <p:cBhvr>
+                                        <p:cTn id="39" dur="500"/>
+                                        <p:tgtEl>
+                                          <p:spTgt spid="6">
+                                            <p:txEl>
+                                              <p:pRg st="11" end="11"/>
+                                            </p:txEl>
+                                          </p:spTgt>
+                                        </p:tgtEl>
+                                      </p:cBhvr>
+                                    </p:animEffect>
+                                  </p:childTnLst>
+                                </p:cTn>
+                              </p:par>
+                              <p:par>
+                                <p:cTn id="40" presetID="22" presetClass="entr" presetSubtype="1" fill="hold" grpId="0" nodeType="withEffect">
+                                  <p:stCondLst>
+                                    <p:cond delay="0"/>
+                                  </p:stCondLst>
+                                  <p:childTnLst>
+                                    <p:set>
+                                      <p:cBhvr>
+                                        <p:cTn id="41" dur="1" fill="hold">
+                                          <p:stCondLst>
+                                            <p:cond delay="0"/>
+                                          </p:stCondLst>
+                                        </p:cTn>
+                                        <p:tgtEl>
+                                          <p:spTgt spid="6">
+                                            <p:txEl>
+                                              <p:pRg st="12" end="12"/>
+                                            </p:txEl>
+                                          </p:spTgt>
+                                        </p:tgtEl>
+                                        <p:attrNameLst>
+                                          <p:attrName>style.visibility</p:attrName>
+                                        </p:attrNameLst>
+                                      </p:cBhvr>
+                                      <p:to>
+                                        <p:strVal val="visible"/>
+                                      </p:to>
+                                    </p:set>
+                                    <p:animEffect transition="in" filter="wipe(up)">
+                                      <p:cBhvr>
+                                        <p:cTn id="42" dur="500"/>
+                                        <p:tgtEl>
+                                          <p:spTgt spid="6">
+                                            <p:txEl>
+                                              <p:pRg st="12" end="12"/>
+                                            </p:txEl>
+                                          </p:spTgt>
+                                        </p:tgtEl>
+                                      </p:cBhvr>
+                                    </p:animEffect>
+                                  </p:childTnLst>
+                                </p:cTn>
+                              </p:par>
+                              <p:par>
+                                <p:cTn id="43" presetID="22" presetClass="entr" presetSubtype="1" fill="hold" grpId="0" nodeType="withEffect">
+                                  <p:stCondLst>
+                                    <p:cond delay="0"/>
+                                  </p:stCondLst>
+                                  <p:childTnLst>
+                                    <p:set>
+                                      <p:cBhvr>
+                                        <p:cTn id="44" dur="1" fill="hold">
+                                          <p:stCondLst>
+                                            <p:cond delay="0"/>
+                                          </p:stCondLst>
+                                        </p:cTn>
+                                        <p:tgtEl>
+                                          <p:spTgt spid="6">
+                                            <p:txEl>
+                                              <p:pRg st="13" end="13"/>
+                                            </p:txEl>
+                                          </p:spTgt>
+                                        </p:tgtEl>
+                                        <p:attrNameLst>
+                                          <p:attrName>style.visibility</p:attrName>
+                                        </p:attrNameLst>
+                                      </p:cBhvr>
+                                      <p:to>
+                                        <p:strVal val="visible"/>
+                                      </p:to>
+                                    </p:set>
+                                    <p:animEffect transition="in" filter="wipe(up)">
+                                      <p:cBhvr>
+                                        <p:cTn id="45" dur="500"/>
+                                        <p:tgtEl>
+                                          <p:spTgt spid="6">
+                                            <p:txEl>
+                                              <p:pRg st="13" end="13"/>
+                                            </p:txEl>
+                                          </p:spTgt>
+                                        </p:tgtEl>
+                                      </p:cBhvr>
+                                    </p:animEffect>
+                                  </p:childTnLst>
+                                </p:cTn>
+                              </p:par>
+                              <p:par>
+                                <p:cTn id="46" presetID="22" presetClass="entr" presetSubtype="1" fill="hold" grpId="0" nodeType="withEffect">
+                                  <p:stCondLst>
+                                    <p:cond delay="0"/>
+                                  </p:stCondLst>
+                                  <p:childTnLst>
+                                    <p:set>
+                                      <p:cBhvr>
+                                        <p:cTn id="47" dur="1" fill="hold">
+                                          <p:stCondLst>
+                                            <p:cond delay="0"/>
+                                          </p:stCondLst>
+                                        </p:cTn>
+                                        <p:tgtEl>
+                                          <p:spTgt spid="6">
+                                            <p:txEl>
+                                              <p:pRg st="14" end="14"/>
+                                            </p:txEl>
+                                          </p:spTgt>
+                                        </p:tgtEl>
+                                        <p:attrNameLst>
+                                          <p:attrName>style.visibility</p:attrName>
+                                        </p:attrNameLst>
+                                      </p:cBhvr>
+                                      <p:to>
+                                        <p:strVal val="visible"/>
+                                      </p:to>
+                                    </p:set>
+                                    <p:animEffect transition="in" filter="wipe(up)">
+                                      <p:cBhvr>
+                                        <p:cTn id="48" dur="500"/>
+                                        <p:tgtEl>
+                                          <p:spTgt spid="6">
+                                            <p:txEl>
+                                              <p:pRg st="14" end="14"/>
+                                            </p:txEl>
+                                          </p:spTgt>
+                                        </p:tgtEl>
+                                      </p:cBhvr>
+                                    </p:animEffect>
+                                  </p:childTnLst>
+                                </p:cTn>
+                              </p:par>
+                              <p:par>
+                                <p:cTn id="49" presetID="22" presetClass="entr" presetSubtype="1" fill="hold" grpId="0" nodeType="withEffect">
+                                  <p:stCondLst>
+                                    <p:cond delay="0"/>
+                                  </p:stCondLst>
+                                  <p:childTnLst>
+                                    <p:set>
+                                      <p:cBhvr>
+                                        <p:cTn id="50" dur="1" fill="hold">
+                                          <p:stCondLst>
+                                            <p:cond delay="0"/>
+                                          </p:stCondLst>
+                                        </p:cTn>
+                                        <p:tgtEl>
+                                          <p:spTgt spid="6">
+                                            <p:txEl>
+                                              <p:pRg st="15" end="15"/>
+                                            </p:txEl>
+                                          </p:spTgt>
+                                        </p:tgtEl>
+                                        <p:attrNameLst>
+                                          <p:attrName>style.visibility</p:attrName>
+                                        </p:attrNameLst>
+                                      </p:cBhvr>
+                                      <p:to>
+                                        <p:strVal val="visible"/>
+                                      </p:to>
+                                    </p:set>
+                                    <p:animEffect transition="in" filter="wipe(up)">
+                                      <p:cBhvr>
+                                        <p:cTn id="51" dur="500"/>
+                                        <p:tgtEl>
+                                          <p:spTgt spid="6">
+                                            <p:txEl>
+                                              <p:pRg st="15" end="15"/>
+                                            </p:txEl>
+                                          </p:spTgt>
+                                        </p:tgtEl>
+                                      </p:cBhvr>
+                                    </p:animEffect>
+                                  </p:childTnLst>
+                                </p:cTn>
+                              </p:par>
+                              <p:par>
+                                <p:cTn id="52" presetID="22" presetClass="entr" presetSubtype="1" fill="hold" grpId="0" nodeType="withEffect">
+                                  <p:stCondLst>
+                                    <p:cond delay="0"/>
+                                  </p:stCondLst>
+                                  <p:childTnLst>
+                                    <p:set>
+                                      <p:cBhvr>
+                                        <p:cTn id="53" dur="1" fill="hold">
+                                          <p:stCondLst>
+                                            <p:cond delay="0"/>
+                                          </p:stCondLst>
+                                        </p:cTn>
+                                        <p:tgtEl>
+                                          <p:spTgt spid="6">
+                                            <p:txEl>
+                                              <p:pRg st="16" end="16"/>
+                                            </p:txEl>
+                                          </p:spTgt>
+                                        </p:tgtEl>
+                                        <p:attrNameLst>
+                                          <p:attrName>style.visibility</p:attrName>
+                                        </p:attrNameLst>
+                                      </p:cBhvr>
+                                      <p:to>
+                                        <p:strVal val="visible"/>
+                                      </p:to>
+                                    </p:set>
+                                    <p:animEffect transition="in" filter="wipe(up)">
+                                      <p:cBhvr>
+                                        <p:cTn id="54" dur="500"/>
+                                        <p:tgtEl>
+                                          <p:spTgt spid="6">
+                                            <p:txEl>
+                                              <p:pRg st="16" end="16"/>
+                                            </p:txEl>
+                                          </p:spTgt>
+                                        </p:tgtEl>
+                                      </p:cBhvr>
+                                    </p:animEffect>
+                                  </p:childTnLst>
+                                </p:cTn>
+                              </p:par>
+                            </p:childTnLst>
+                          </p:cTn>
+                        </p:par>
+                      </p:childTnLst>
+                    </p:cTn>
+                  </p:par>
+                  <p:par>
+                    <p:cTn id="55" fill="hold">
+                      <p:stCondLst>
+                        <p:cond delay="indefinite"/>
+                      </p:stCondLst>
+                      <p:childTnLst>
+                        <p:par>
+                          <p:cTn id="56" fill="hold">
+                            <p:stCondLst>
+                              <p:cond delay="0"/>
+                            </p:stCondLst>
+                            <p:childTnLst>
+                              <p:par>
+                                <p:cTn id="57" presetID="22" presetClass="entr" presetSubtype="1" fill="hold" grpId="0" nodeType="clickEffect">
+                                  <p:stCondLst>
+                                    <p:cond delay="0"/>
+                                  </p:stCondLst>
+                                  <p:childTnLst>
+                                    <p:set>
+                                      <p:cBhvr>
+                                        <p:cTn id="58" dur="1" fill="hold">
+                                          <p:stCondLst>
+                                            <p:cond delay="0"/>
+                                          </p:stCondLst>
+                                        </p:cTn>
+                                        <p:tgtEl>
+                                          <p:spTgt spid="6">
+                                            <p:txEl>
+                                              <p:pRg st="18" end="18"/>
+                                            </p:txEl>
+                                          </p:spTgt>
+                                        </p:tgtEl>
+                                        <p:attrNameLst>
+                                          <p:attrName>style.visibility</p:attrName>
+                                        </p:attrNameLst>
+                                      </p:cBhvr>
+                                      <p:to>
+                                        <p:strVal val="visible"/>
+                                      </p:to>
+                                    </p:set>
+                                    <p:animEffect transition="in" filter="wipe(up)">
+                                      <p:cBhvr>
+                                        <p:cTn id="59" dur="500"/>
+                                        <p:tgtEl>
+                                          <p:spTgt spid="6">
+                                            <p:txEl>
+                                              <p:pRg st="18" end="18"/>
+                                            </p:txEl>
+                                          </p:spTgt>
+                                        </p:tgtEl>
+                                      </p:cBhvr>
+                                    </p:animEffect>
+                                  </p:childTnLst>
+                                </p:cTn>
+                              </p:par>
+                              <p:par>
+                                <p:cTn id="60" presetID="22" presetClass="entr" presetSubtype="1" fill="hold" grpId="0" nodeType="withEffect">
+                                  <p:stCondLst>
+                                    <p:cond delay="0"/>
+                                  </p:stCondLst>
+                                  <p:childTnLst>
+                                    <p:set>
+                                      <p:cBhvr>
+                                        <p:cTn id="61" dur="1" fill="hold">
+                                          <p:stCondLst>
+                                            <p:cond delay="0"/>
+                                          </p:stCondLst>
+                                        </p:cTn>
+                                        <p:tgtEl>
+                                          <p:spTgt spid="6">
+                                            <p:txEl>
+                                              <p:pRg st="19" end="19"/>
+                                            </p:txEl>
+                                          </p:spTgt>
+                                        </p:tgtEl>
+                                        <p:attrNameLst>
+                                          <p:attrName>style.visibility</p:attrName>
+                                        </p:attrNameLst>
+                                      </p:cBhvr>
+                                      <p:to>
+                                        <p:strVal val="visible"/>
+                                      </p:to>
+                                    </p:set>
+                                    <p:animEffect transition="in" filter="wipe(up)">
+                                      <p:cBhvr>
+                                        <p:cTn id="62" dur="500"/>
+                                        <p:tgtEl>
+                                          <p:spTgt spid="6">
+                                            <p:txEl>
+                                              <p:pRg st="19" end="19"/>
+                                            </p:txEl>
+                                          </p:spTgt>
+                                        </p:tgtEl>
+                                      </p:cBhvr>
+                                    </p:animEffect>
+                                  </p:childTnLst>
+                                </p:cTn>
+                              </p:par>
+                            </p:childTnLst>
+                          </p:cTn>
+                        </p:par>
+                      </p:childTnLst>
+                    </p:cTn>
+                  </p:par>
+                  <p:par>
+                    <p:cTn id="63" fill="hold">
+                      <p:stCondLst>
+                        <p:cond delay="indefinite"/>
+                      </p:stCondLst>
+                      <p:childTnLst>
+                        <p:par>
+                          <p:cTn id="64" fill="hold">
+                            <p:stCondLst>
+                              <p:cond delay="0"/>
+                            </p:stCondLst>
+                            <p:childTnLst>
+                              <p:par>
+                                <p:cTn id="65" presetID="22" presetClass="entr" presetSubtype="1" fill="hold" grpId="0" nodeType="clickEffect">
+                                  <p:stCondLst>
+                                    <p:cond delay="0"/>
+                                  </p:stCondLst>
+                                  <p:childTnLst>
+                                    <p:set>
+                                      <p:cBhvr>
+                                        <p:cTn id="66" dur="1" fill="hold">
+                                          <p:stCondLst>
+                                            <p:cond delay="0"/>
+                                          </p:stCondLst>
+                                        </p:cTn>
+                                        <p:tgtEl>
+                                          <p:spTgt spid="6">
+                                            <p:txEl>
+                                              <p:pRg st="21" end="21"/>
+                                            </p:txEl>
+                                          </p:spTgt>
+                                        </p:tgtEl>
+                                        <p:attrNameLst>
+                                          <p:attrName>style.visibility</p:attrName>
+                                        </p:attrNameLst>
+                                      </p:cBhvr>
+                                      <p:to>
+                                        <p:strVal val="visible"/>
+                                      </p:to>
+                                    </p:set>
+                                    <p:animEffect transition="in" filter="wipe(up)">
+                                      <p:cBhvr>
+                                        <p:cTn id="67" dur="500"/>
+                                        <p:tgtEl>
+                                          <p:spTgt spid="6">
+                                            <p:txEl>
+                                              <p:pRg st="21" end="21"/>
+                                            </p:txEl>
+                                          </p:spTgt>
+                                        </p:tgtEl>
+                                      </p:cBhvr>
+                                    </p:animEffect>
+                                  </p:childTnLst>
+                                </p:cTn>
+                              </p:par>
+                              <p:par>
+                                <p:cTn id="68" presetID="22" presetClass="entr" presetSubtype="1" fill="hold" grpId="0" nodeType="withEffect">
+                                  <p:stCondLst>
+                                    <p:cond delay="0"/>
+                                  </p:stCondLst>
+                                  <p:childTnLst>
+                                    <p:set>
+                                      <p:cBhvr>
+                                        <p:cTn id="69" dur="1" fill="hold">
+                                          <p:stCondLst>
+                                            <p:cond delay="0"/>
+                                          </p:stCondLst>
+                                        </p:cTn>
+                                        <p:tgtEl>
+                                          <p:spTgt spid="6">
+                                            <p:txEl>
+                                              <p:pRg st="22" end="22"/>
+                                            </p:txEl>
+                                          </p:spTgt>
+                                        </p:tgtEl>
+                                        <p:attrNameLst>
+                                          <p:attrName>style.visibility</p:attrName>
+                                        </p:attrNameLst>
+                                      </p:cBhvr>
+                                      <p:to>
+                                        <p:strVal val="visible"/>
+                                      </p:to>
+                                    </p:set>
+                                    <p:animEffect transition="in" filter="wipe(up)">
+                                      <p:cBhvr>
+                                        <p:cTn id="70" dur="500"/>
+                                        <p:tgtEl>
+                                          <p:spTgt spid="6">
+                                            <p:txEl>
+                                              <p:pRg st="22" end="22"/>
+                                            </p:txEl>
+                                          </p:spTgt>
+                                        </p:tgtEl>
+                                      </p:cBhvr>
+                                    </p:animEffect>
+                                  </p:childTnLst>
+                                </p:cTn>
+                              </p:par>
+                              <p:par>
+                                <p:cTn id="71" presetID="22" presetClass="entr" presetSubtype="1" fill="hold" grpId="0" nodeType="withEffect">
+                                  <p:stCondLst>
+                                    <p:cond delay="0"/>
+                                  </p:stCondLst>
+                                  <p:childTnLst>
+                                    <p:set>
+                                      <p:cBhvr>
+                                        <p:cTn id="72" dur="1" fill="hold">
+                                          <p:stCondLst>
+                                            <p:cond delay="0"/>
+                                          </p:stCondLst>
+                                        </p:cTn>
+                                        <p:tgtEl>
+                                          <p:spTgt spid="6">
+                                            <p:txEl>
+                                              <p:pRg st="23" end="23"/>
+                                            </p:txEl>
+                                          </p:spTgt>
+                                        </p:tgtEl>
+                                        <p:attrNameLst>
+                                          <p:attrName>style.visibility</p:attrName>
+                                        </p:attrNameLst>
+                                      </p:cBhvr>
+                                      <p:to>
+                                        <p:strVal val="visible"/>
+                                      </p:to>
+                                    </p:set>
+                                    <p:animEffect transition="in" filter="wipe(up)">
+                                      <p:cBhvr>
+                                        <p:cTn id="73" dur="500"/>
+                                        <p:tgtEl>
+                                          <p:spTgt spid="6">
+                                            <p:txEl>
+                                              <p:pRg st="23" end="23"/>
+                                            </p:txEl>
+                                          </p:spTgt>
+                                        </p:tgtEl>
+                                      </p:cBhvr>
+                                    </p:animEffect>
+                                  </p:childTnLst>
+                                </p:cTn>
+                              </p:par>
+                            </p:childTnLst>
+                          </p:cTn>
+                        </p:par>
+                      </p:childTnLst>
+                    </p:cTn>
+                  </p:par>
+                  <p:par>
+                    <p:cTn id="74" fill="hold">
+                      <p:stCondLst>
+                        <p:cond delay="indefinite"/>
+                      </p:stCondLst>
+                      <p:childTnLst>
+                        <p:par>
+                          <p:cTn id="75" fill="hold">
+                            <p:stCondLst>
+                              <p:cond delay="0"/>
+                            </p:stCondLst>
+                            <p:childTnLst>
+                              <p:par>
+                                <p:cTn id="76" presetID="9" presetClass="entr" presetSubtype="0" fill="hold" grpId="0" nodeType="clickEffect">
+                                  <p:stCondLst>
+                                    <p:cond delay="0"/>
+                                  </p:stCondLst>
+                                  <p:childTnLst>
+                                    <p:set>
+                                      <p:cBhvr>
+                                        <p:cTn id="77" dur="1" fill="hold">
+                                          <p:stCondLst>
+                                            <p:cond delay="0"/>
+                                          </p:stCondLst>
+                                        </p:cTn>
+                                        <p:tgtEl>
+                                          <p:spTgt spid="3"/>
+                                        </p:tgtEl>
+                                        <p:attrNameLst>
+                                          <p:attrName>style.visibility</p:attrName>
+                                        </p:attrNameLst>
+                                      </p:cBhvr>
+                                      <p:to>
+                                        <p:strVal val="visible"/>
+                                      </p:to>
+                                    </p:set>
+                                    <p:animEffect transition="in" filter="dissolve">
+                                      <p:cBhvr>
+                                        <p:cTn id="78" dur="500"/>
+                                        <p:tgtEl>
+                                          <p:spTgt spid="3"/>
+                                        </p:tgtEl>
+                                      </p:cBhvr>
+                                    </p:animEffect>
+                                  </p:childTnLst>
+                                </p:cTn>
+                              </p:par>
+                            </p:childTnLst>
+                          </p:cTn>
+                        </p:par>
+                      </p:childTnLst>
+                    </p:cTn>
+                  </p:par>
+                  <p:par>
+                    <p:cTn id="79" fill="hold">
+                      <p:stCondLst>
+                        <p:cond delay="indefinite"/>
+                      </p:stCondLst>
+                      <p:childTnLst>
+                        <p:par>
+                          <p:cTn id="80" fill="hold">
+                            <p:stCondLst>
+                              <p:cond delay="0"/>
+                            </p:stCondLst>
+                            <p:childTnLst>
+                              <p:par>
+                                <p:cTn id="81" presetID="22" presetClass="entr" presetSubtype="1" fill="hold" grpId="0" nodeType="clickEffect">
+                                  <p:stCondLst>
+                                    <p:cond delay="0"/>
+                                  </p:stCondLst>
+                                  <p:childTnLst>
+                                    <p:set>
+                                      <p:cBhvr>
+                                        <p:cTn id="82" dur="1" fill="hold">
+                                          <p:stCondLst>
+                                            <p:cond delay="0"/>
+                                          </p:stCondLst>
+                                        </p:cTn>
+                                        <p:tgtEl>
+                                          <p:spTgt spid="6">
+                                            <p:txEl>
+                                              <p:pRg st="25" end="25"/>
+                                            </p:txEl>
+                                          </p:spTgt>
+                                        </p:tgtEl>
+                                        <p:attrNameLst>
+                                          <p:attrName>style.visibility</p:attrName>
+                                        </p:attrNameLst>
+                                      </p:cBhvr>
+                                      <p:to>
+                                        <p:strVal val="visible"/>
+                                      </p:to>
+                                    </p:set>
+                                    <p:animEffect transition="in" filter="wipe(up)">
+                                      <p:cBhvr>
+                                        <p:cTn id="83" dur="500"/>
+                                        <p:tgtEl>
+                                          <p:spTgt spid="6">
+                                            <p:txEl>
+                                              <p:pRg st="25" end="25"/>
+                                            </p:txEl>
+                                          </p:spTgt>
+                                        </p:tgtEl>
+                                      </p:cBhvr>
+                                    </p:animEffect>
+                                  </p:childTnLst>
+                                </p:cTn>
+                              </p:par>
+                            </p:childTnLst>
+                          </p:cTn>
+                        </p:par>
+                      </p:childTnLst>
+                    </p:cTn>
+                  </p:par>
+                </p:childTnLst>
+              </p:cTn>
+              <p:prevCondLst>
+                <p:cond evt="onPrev" delay="0">
+                  <p:tgtEl>
+                    <p:sldTgt/>
+                  </p:tgtEl>
+                </p:cond>
+              </p:prevCondLst>
+              <p:nextCondLst>
+                <p:cond evt="onNext" delay="0">
+                  <p:tgtEl>
+                    <p:sldTgt/>
+                  </p:tgtEl>
+                </p:cond>
+              </p:nextCondLst>
+            </p:seq>
+          </p:childTnLst>
+        </p:cTn>
+      </p:par>
+    </p:tnLst>
+    <p:bldLst>
+      <p:bldP spid="3" grpId="0" animBg="1"/>
+      <p:bldP spid="6" grpId="0" uiExpand="1" build="p"/>
+    </p:bldLst>
+  </p:timing>
 </p:sld>
 </file>
 
@@ -15541,6 +18170,63 @@
       </p:grpSpPr>
       <p:sp>
         <p:nvSpPr>
+          <p:cNvPr id="11" name="Rectangle 10">
+            <a:extLst>
+              <a:ext uri="{FF2B5EF4-FFF2-40B4-BE49-F238E27FC236}">
+                <a16:creationId xmlns:a16="http://schemas.microsoft.com/office/drawing/2014/main" id="{04D49904-9555-C346-9856-0224BF83D53D}"/>
+              </a:ext>
+            </a:extLst>
+          </p:cNvPr>
+          <p:cNvSpPr/>
+          <p:nvPr/>
+        </p:nvSpPr>
+        <p:spPr>
+          <a:xfrm>
+            <a:off x="4042593" y="4356908"/>
+            <a:ext cx="4937283" cy="1176384"/>
+          </a:xfrm>
+          <a:prstGeom prst="rect">
+            <a:avLst/>
+          </a:prstGeom>
+          <a:solidFill>
+            <a:schemeClr val="bg1">
+              <a:lumMod val="75000"/>
+            </a:schemeClr>
+          </a:solidFill>
+          <a:ln>
+            <a:solidFill>
+              <a:schemeClr val="bg1">
+                <a:lumMod val="50000"/>
+              </a:schemeClr>
+            </a:solidFill>
+          </a:ln>
+          <a:effectLst/>
+        </p:spPr>
+        <p:style>
+          <a:lnRef idx="1">
+            <a:schemeClr val="accent1"/>
+          </a:lnRef>
+          <a:fillRef idx="3">
+            <a:schemeClr val="accent1"/>
+          </a:fillRef>
+          <a:effectRef idx="2">
+            <a:schemeClr val="accent1"/>
+          </a:effectRef>
+          <a:fontRef idx="minor">
+            <a:schemeClr val="lt1"/>
+          </a:fontRef>
+        </p:style>
+        <p:txBody>
+          <a:bodyPr rtlCol="0" anchor="ctr"/>
+          <a:lstStyle/>
+          <a:p>
+            <a:pPr algn="ctr"/>
+            <a:endParaRPr lang="en-US"/>
+          </a:p>
+        </p:txBody>
+      </p:sp>
+      <p:sp>
+        <p:nvSpPr>
           <p:cNvPr id="2" name="Title 1"/>
           <p:cNvSpPr>
             <a:spLocks noGrp="1"/>
@@ -16638,96 +19324,6 @@
       </p:sp>
       <p:sp>
         <p:nvSpPr>
-          <p:cNvPr id="3" name="TextBox 2"/>
-          <p:cNvSpPr txBox="1"/>
-          <p:nvPr/>
-        </p:nvSpPr>
-        <p:spPr>
-          <a:xfrm>
-            <a:off x="134771" y="6397161"/>
-            <a:ext cx="5076056" cy="461665"/>
-          </a:xfrm>
-          <a:prstGeom prst="rect">
-            <a:avLst/>
-          </a:prstGeom>
-          <a:noFill/>
-        </p:spPr>
-        <p:txBody>
-          <a:bodyPr wrap="square" rtlCol="0">
-            <a:spAutoFit/>
-          </a:bodyPr>
-          <a:lstStyle/>
-          <a:p>
-            <a:r>
-              <a:rPr lang="en-US" sz="1200" b="1" dirty="0">
-                <a:solidFill>
-                  <a:srgbClr val="3366FF"/>
-                </a:solidFill>
-                <a:latin typeface="Courier New"/>
-                <a:cs typeface="Courier New"/>
-              </a:rPr>
-              <a:t>*</a:t>
-            </a:r>
-            <a:r>
-              <a:rPr lang="en-US" sz="1200" b="1" dirty="0">
-                <a:cs typeface="Courier New"/>
-              </a:rPr>
-              <a:t>Can be </a:t>
-            </a:r>
-            <a:r>
-              <a:rPr lang="en-US" sz="1200" b="1" dirty="0">
-                <a:solidFill>
-                  <a:srgbClr val="3366FF"/>
-                </a:solidFill>
-                <a:latin typeface="Courier New"/>
-                <a:cs typeface="Courier New"/>
-              </a:rPr>
-              <a:t>CL_MAP_READ</a:t>
-            </a:r>
-            <a:r>
-              <a:rPr lang="en-US" sz="1200" b="1" dirty="0">
-                <a:cs typeface="Courier New"/>
-              </a:rPr>
-              <a:t>, </a:t>
-            </a:r>
-            <a:r>
-              <a:rPr lang="en-US" sz="1200" b="1" dirty="0">
-                <a:solidFill>
-                  <a:srgbClr val="3366FF"/>
-                </a:solidFill>
-                <a:latin typeface="Courier New"/>
-                <a:cs typeface="Courier New"/>
-              </a:rPr>
-              <a:t>CL_MAP_WRITE</a:t>
-            </a:r>
-            <a:r>
-              <a:rPr lang="en-US" sz="1200" b="1" dirty="0">
-                <a:cs typeface="Courier New"/>
-              </a:rPr>
-              <a:t> or </a:t>
-            </a:r>
-            <a:r>
-              <a:rPr lang="en-US" sz="1200" b="1" dirty="0">
-                <a:solidFill>
-                  <a:srgbClr val="3366FF"/>
-                </a:solidFill>
-                <a:latin typeface="Courier New"/>
-                <a:cs typeface="Courier New"/>
-              </a:rPr>
-              <a:t>CL_MAP_WRITE_INVALIDATE_REGION</a:t>
-            </a:r>
-            <a:r>
-              <a:rPr lang="en-US" sz="1200" b="1" dirty="0">
-                <a:cs typeface="Courier New"/>
-              </a:rPr>
-              <a:t> (OpenCL 1.2).</a:t>
-            </a:r>
-            <a:endParaRPr lang="en-GB" sz="1200" dirty="0"/>
-          </a:p>
-        </p:txBody>
-      </p:sp>
-      <p:sp>
-        <p:nvSpPr>
           <p:cNvPr id="5" name="Right Brace 4">
             <a:extLst>
               <a:ext uri="{FF2B5EF4-FFF2-40B4-BE49-F238E27FC236}">
@@ -16746,6 +19342,7 @@
           <a:prstGeom prst="rightBrace">
             <a:avLst/>
           </a:prstGeom>
+          <a:effectLst/>
         </p:spPr>
         <p:style>
           <a:lnRef idx="2">
@@ -16832,6 +19429,102 @@
               <a:t>33</a:t>
             </a:fld>
             <a:endParaRPr lang="en-GB"/>
+          </a:p>
+        </p:txBody>
+      </p:sp>
+      <p:sp>
+        <p:nvSpPr>
+          <p:cNvPr id="10" name="TextBox 9">
+            <a:extLst>
+              <a:ext uri="{FF2B5EF4-FFF2-40B4-BE49-F238E27FC236}">
+                <a16:creationId xmlns:a16="http://schemas.microsoft.com/office/drawing/2014/main" id="{6C606689-EDF4-FD42-AFD9-697506060AFE}"/>
+              </a:ext>
+            </a:extLst>
+          </p:cNvPr>
+          <p:cNvSpPr txBox="1"/>
+          <p:nvPr/>
+        </p:nvSpPr>
+        <p:spPr>
+          <a:xfrm>
+            <a:off x="791259" y="6629850"/>
+            <a:ext cx="7520400" cy="276999"/>
+          </a:xfrm>
+          <a:prstGeom prst="rect">
+            <a:avLst/>
+          </a:prstGeom>
+          <a:noFill/>
+        </p:spPr>
+        <p:txBody>
+          <a:bodyPr wrap="square" rtlCol="0">
+            <a:spAutoFit/>
+          </a:bodyPr>
+          <a:lstStyle/>
+          <a:p>
+            <a:r>
+              <a:rPr lang="en-US" sz="1200" b="1" dirty="0">
+                <a:solidFill>
+                  <a:srgbClr val="FF0000"/>
+                </a:solidFill>
+                <a:latin typeface="Courier New"/>
+                <a:cs typeface="Courier New"/>
+              </a:rPr>
+              <a:t>*</a:t>
+            </a:r>
+            <a:r>
+              <a:rPr lang="en-US" sz="1200" b="1" dirty="0">
+                <a:cs typeface="Courier New"/>
+              </a:rPr>
+              <a:t>Can be </a:t>
+            </a:r>
+            <a:r>
+              <a:rPr lang="en-US" sz="1200" b="1" dirty="0">
+                <a:solidFill>
+                  <a:srgbClr val="3366FF"/>
+                </a:solidFill>
+                <a:latin typeface="Courier New"/>
+                <a:cs typeface="Courier New"/>
+              </a:rPr>
+              <a:t>CL_MAP_READ</a:t>
+            </a:r>
+            <a:r>
+              <a:rPr lang="en-US" sz="1200" b="1" dirty="0">
+                <a:cs typeface="Courier New"/>
+              </a:rPr>
+              <a:t>, </a:t>
+            </a:r>
+            <a:r>
+              <a:rPr lang="en-US" sz="1200" b="1" dirty="0">
+                <a:solidFill>
+                  <a:srgbClr val="3366FF"/>
+                </a:solidFill>
+                <a:latin typeface="Courier New"/>
+                <a:cs typeface="Courier New"/>
+              </a:rPr>
+              <a:t>CL_MAP_WRITE</a:t>
+            </a:r>
+            <a:r>
+              <a:rPr lang="en-US" sz="1200" b="1" dirty="0">
+                <a:cs typeface="Courier New"/>
+              </a:rPr>
+              <a:t> or </a:t>
+            </a:r>
+            <a:r>
+              <a:rPr lang="en-US" sz="1200" b="1" dirty="0">
+                <a:solidFill>
+                  <a:srgbClr val="3366FF"/>
+                </a:solidFill>
+                <a:latin typeface="Courier New"/>
+                <a:cs typeface="Courier New"/>
+              </a:rPr>
+              <a:t>CL_MAP_WRITE_INVALIDATE_REGION</a:t>
+            </a:r>
+            <a:r>
+              <a:rPr lang="en-US" sz="1200" b="1" dirty="0">
+                <a:cs typeface="Courier New"/>
+              </a:rPr>
+              <a:t> (OpenCL 1.2).</a:t>
+            </a:r>
+            <a:endParaRPr lang="en-GB" sz="1200" dirty="0"/>
           </a:p>
         </p:txBody>
       </p:sp>
@@ -16925,6 +19618,59 @@
                       </p:childTnLst>
                     </p:cTn>
                   </p:par>
+                  <p:par>
+                    <p:cTn id="9" fill="hold">
+                      <p:stCondLst>
+                        <p:cond delay="indefinite"/>
+                      </p:stCondLst>
+                      <p:childTnLst>
+                        <p:par>
+                          <p:cTn id="10" fill="hold">
+                            <p:stCondLst>
+                              <p:cond delay="0"/>
+                            </p:stCondLst>
+                            <p:childTnLst>
+                              <p:par>
+                                <p:cTn id="11" presetID="9" presetClass="entr" presetSubtype="0" fill="hold" grpId="0" nodeType="clickEffect">
+                                  <p:stCondLst>
+                                    <p:cond delay="0"/>
+                                  </p:stCondLst>
+                                  <p:childTnLst>
+                                    <p:set>
+                                      <p:cBhvr>
+                                        <p:cTn id="12" dur="1" fill="hold">
+                                          <p:stCondLst>
+                                            <p:cond delay="0"/>
+                                          </p:stCondLst>
+                                        </p:cTn>
+                                        <p:tgtEl>
+                                          <p:spTgt spid="11"/>
+                                        </p:tgtEl>
+                                        <p:attrNameLst>
+                                          <p:attrName>style.visibility</p:attrName>
+                                        </p:attrNameLst>
+                                      </p:cBhvr>
+                                      <p:to>
+                                        <p:strVal val="visible"/>
+                                      </p:to>
+                                    </p:set>
+                                    <p:animEffect transition="in" filter="dissolve">
+                                      <p:cBhvr>
+                                        <p:cTn id="13" dur="500"/>
+                                        <p:tgtEl>
+                                          <p:spTgt spid="11"/>
+                                        </p:tgtEl>
+                                      </p:cBhvr>
+                                    </p:animEffect>
+                                  </p:childTnLst>
+                                </p:cTn>
+                              </p:par>
+                            </p:childTnLst>
+                          </p:cTn>
+                        </p:par>
+                      </p:childTnLst>
+                    </p:cTn>
+                  </p:par>
                 </p:childTnLst>
               </p:cTn>
               <p:prevCondLst>
@@ -16947,6 +19693,7 @@
       </p:par>
     </p:tnLst>
     <p:bldLst>
+      <p:bldP spid="11" grpId="0" animBg="1"/>
       <p:bldP spid="5" grpId="0" animBg="1"/>
       <p:bldP spid="7" grpId="0"/>
     </p:bldLst>

</xml_diff>